<commit_message>
Added lecture about coroutines.
</commit_message>
<xml_diff>
--- a/src/lectures/kotlin-asynchronous-operations/kotlin-asynchronous-operations.pptx
+++ b/src/lectures/kotlin-asynchronous-operations/kotlin-asynchronous-operations.pptx
@@ -214,7 +214,7 @@
           <a:p>
             <a:fld id="{6D65E8AE-67CB-425F-A941-9EF2C260E158}" type="datetimeFigureOut">
               <a:rPr lang="sv-SE" smtClean="0"/>
-              <a:t>2020-02-07</a:t>
+              <a:t>2021-02-08</a:t>
             </a:fld>
             <a:endParaRPr lang="sv-SE"/>
           </a:p>
@@ -379,7 +379,7 @@
           <a:p>
             <a:fld id="{38366049-D807-473D-9795-762417EEF104}" type="datetimeFigureOut">
               <a:rPr lang="en-US" smtClean="0"/>
-              <a:t>2/7/2020</a:t>
+              <a:t>2/8/2021</a:t>
             </a:fld>
             <a:endParaRPr lang="en-US"/>
           </a:p>
@@ -688,7 +688,7 @@
           <a:p>
             <a:fld id="{428859CC-B640-4DB3-BB6F-301CDED75AAD}" type="datetimeFigureOut">
               <a:rPr lang="sv-SE" smtClean="0"/>
-              <a:t>2020-02-07</a:t>
+              <a:t>2021-02-08</a:t>
             </a:fld>
             <a:endParaRPr lang="sv-SE"/>
           </a:p>
@@ -1038,7 +1038,7 @@
           <a:p>
             <a:fld id="{428859CC-B640-4DB3-BB6F-301CDED75AAD}" type="datetimeFigureOut">
               <a:rPr lang="sv-SE" smtClean="0"/>
-              <a:t>2020-02-07</a:t>
+              <a:t>2021-02-08</a:t>
             </a:fld>
             <a:endParaRPr lang="sv-SE"/>
           </a:p>
@@ -1288,7 +1288,7 @@
           <a:p>
             <a:fld id="{428859CC-B640-4DB3-BB6F-301CDED75AAD}" type="datetimeFigureOut">
               <a:rPr lang="sv-SE" smtClean="0"/>
-              <a:t>2020-02-07</a:t>
+              <a:t>2021-02-08</a:t>
             </a:fld>
             <a:endParaRPr lang="sv-SE"/>
           </a:p>
@@ -1647,7 +1647,7 @@
           <a:p>
             <a:fld id="{428859CC-B640-4DB3-BB6F-301CDED75AAD}" type="datetimeFigureOut">
               <a:rPr lang="sv-SE" smtClean="0"/>
-              <a:t>2020-02-07</a:t>
+              <a:t>2021-02-08</a:t>
             </a:fld>
             <a:endParaRPr lang="sv-SE"/>
           </a:p>
@@ -1998,7 +1998,7 @@
           <a:p>
             <a:fld id="{428859CC-B640-4DB3-BB6F-301CDED75AAD}" type="datetimeFigureOut">
               <a:rPr lang="sv-SE" smtClean="0"/>
-              <a:t>2020-02-07</a:t>
+              <a:t>2021-02-08</a:t>
             </a:fld>
             <a:endParaRPr lang="sv-SE"/>
           </a:p>
@@ -2430,7 +2430,7 @@
           <a:p>
             <a:fld id="{428859CC-B640-4DB3-BB6F-301CDED75AAD}" type="datetimeFigureOut">
               <a:rPr lang="sv-SE" smtClean="0"/>
-              <a:t>2020-02-07</a:t>
+              <a:t>2021-02-08</a:t>
             </a:fld>
             <a:endParaRPr lang="sv-SE"/>
           </a:p>
@@ -2854,7 +2854,7 @@
           <a:p>
             <a:fld id="{428859CC-B640-4DB3-BB6F-301CDED75AAD}" type="datetimeFigureOut">
               <a:rPr lang="sv-SE" smtClean="0"/>
-              <a:t>2020-02-07</a:t>
+              <a:t>2021-02-08</a:t>
             </a:fld>
             <a:endParaRPr lang="sv-SE"/>
           </a:p>
@@ -3286,7 +3286,7 @@
           <a:p>
             <a:fld id="{428859CC-B640-4DB3-BB6F-301CDED75AAD}" type="datetimeFigureOut">
               <a:rPr lang="sv-SE" smtClean="0"/>
-              <a:t>2020-02-07</a:t>
+              <a:t>2021-02-08</a:t>
             </a:fld>
             <a:endParaRPr lang="sv-SE"/>
           </a:p>
@@ -3612,7 +3612,7 @@
           <a:p>
             <a:fld id="{428859CC-B640-4DB3-BB6F-301CDED75AAD}" type="datetimeFigureOut">
               <a:rPr lang="sv-SE" smtClean="0"/>
-              <a:t>2020-02-07</a:t>
+              <a:t>2021-02-08</a:t>
             </a:fld>
             <a:endParaRPr lang="sv-SE"/>
           </a:p>
@@ -3812,7 +3812,7 @@
           <a:p>
             <a:fld id="{428859CC-B640-4DB3-BB6F-301CDED75AAD}" type="datetimeFigureOut">
               <a:rPr lang="sv-SE" smtClean="0"/>
-              <a:t>2020-02-07</a:t>
+              <a:t>2021-02-08</a:t>
             </a:fld>
             <a:endParaRPr lang="sv-SE"/>
           </a:p>
@@ -3973,7 +3973,7 @@
           <a:p>
             <a:fld id="{428859CC-B640-4DB3-BB6F-301CDED75AAD}" type="datetimeFigureOut">
               <a:rPr lang="sv-SE" smtClean="0"/>
-              <a:t>2020-02-07</a:t>
+              <a:t>2021-02-08</a:t>
             </a:fld>
             <a:endParaRPr lang="sv-SE"/>
           </a:p>
@@ -4241,7 +4241,7 @@
           <a:p>
             <a:fld id="{428859CC-B640-4DB3-BB6F-301CDED75AAD}" type="datetimeFigureOut">
               <a:rPr lang="sv-SE" smtClean="0"/>
-              <a:t>2020-02-07</a:t>
+              <a:t>2021-02-08</a:t>
             </a:fld>
             <a:endParaRPr lang="sv-SE"/>
           </a:p>
@@ -4446,7 +4446,7 @@
           <a:p>
             <a:fld id="{428859CC-B640-4DB3-BB6F-301CDED75AAD}" type="datetimeFigureOut">
               <a:rPr lang="sv-SE" smtClean="0"/>
-              <a:t>2020-02-07</a:t>
+              <a:t>2021-02-08</a:t>
             </a:fld>
             <a:endParaRPr lang="sv-SE"/>
           </a:p>
@@ -4668,7 +4668,7 @@
           <a:p>
             <a:fld id="{428859CC-B640-4DB3-BB6F-301CDED75AAD}" type="datetimeFigureOut">
               <a:rPr lang="sv-SE" smtClean="0"/>
-              <a:t>2020-02-07</a:t>
+              <a:t>2021-02-08</a:t>
             </a:fld>
             <a:endParaRPr lang="sv-SE"/>
           </a:p>
@@ -4902,7 +4902,7 @@
           <a:p>
             <a:fld id="{428859CC-B640-4DB3-BB6F-301CDED75AAD}" type="datetimeFigureOut">
               <a:rPr lang="sv-SE" smtClean="0"/>
-              <a:t>2020-02-07</a:t>
+              <a:t>2021-02-08</a:t>
             </a:fld>
             <a:endParaRPr lang="sv-SE"/>
           </a:p>
@@ -5124,7 +5124,7 @@
           <a:p>
             <a:fld id="{428859CC-B640-4DB3-BB6F-301CDED75AAD}" type="datetimeFigureOut">
               <a:rPr lang="sv-SE" smtClean="0"/>
-              <a:t>2020-02-07</a:t>
+              <a:t>2021-02-08</a:t>
             </a:fld>
             <a:endParaRPr lang="sv-SE"/>
           </a:p>
@@ -5358,7 +5358,7 @@
           <a:p>
             <a:fld id="{428859CC-B640-4DB3-BB6F-301CDED75AAD}" type="datetimeFigureOut">
               <a:rPr lang="sv-SE" smtClean="0"/>
-              <a:t>2020-02-07</a:t>
+              <a:t>2021-02-08</a:t>
             </a:fld>
             <a:endParaRPr lang="sv-SE"/>
           </a:p>
@@ -5772,7 +5772,7 @@
           <a:p>
             <a:fld id="{428859CC-B640-4DB3-BB6F-301CDED75AAD}" type="datetimeFigureOut">
               <a:rPr lang="sv-SE" smtClean="0"/>
-              <a:t>2020-02-07</a:t>
+              <a:t>2021-02-08</a:t>
             </a:fld>
             <a:endParaRPr lang="sv-SE"/>
           </a:p>
@@ -6184,7 +6184,7 @@
           <a:p>
             <a:fld id="{428859CC-B640-4DB3-BB6F-301CDED75AAD}" type="datetimeFigureOut">
               <a:rPr lang="sv-SE" smtClean="0"/>
-              <a:t>2020-02-07</a:t>
+              <a:t>2021-02-08</a:t>
             </a:fld>
             <a:endParaRPr lang="sv-SE"/>
           </a:p>
@@ -6501,7 +6501,7 @@
           <a:p>
             <a:fld id="{428859CC-B640-4DB3-BB6F-301CDED75AAD}" type="datetimeFigureOut">
               <a:rPr lang="sv-SE" smtClean="0"/>
-              <a:t>2020-02-07</a:t>
+              <a:t>2021-02-08</a:t>
             </a:fld>
             <a:endParaRPr lang="sv-SE"/>
           </a:p>
@@ -6816,7 +6816,7 @@
           <a:p>
             <a:fld id="{428859CC-B640-4DB3-BB6F-301CDED75AAD}" type="datetimeFigureOut">
               <a:rPr lang="sv-SE" smtClean="0"/>
-              <a:t>2020-02-07</a:t>
+              <a:t>2021-02-08</a:t>
             </a:fld>
             <a:endParaRPr lang="sv-SE"/>
           </a:p>
@@ -7104,7 +7104,7 @@
           <a:p>
             <a:fld id="{428859CC-B640-4DB3-BB6F-301CDED75AAD}" type="datetimeFigureOut">
               <a:rPr lang="sv-SE" smtClean="0"/>
-              <a:t>2020-02-07</a:t>
+              <a:t>2021-02-08</a:t>
             </a:fld>
             <a:endParaRPr lang="sv-SE"/>
           </a:p>
@@ -7406,7 +7406,7 @@
           <a:p>
             <a:fld id="{428859CC-B640-4DB3-BB6F-301CDED75AAD}" type="datetimeFigureOut">
               <a:rPr lang="sv-SE" smtClean="0"/>
-              <a:t>2020-02-07</a:t>
+              <a:t>2021-02-08</a:t>
             </a:fld>
             <a:endParaRPr lang="sv-SE"/>
           </a:p>
@@ -7688,7 +7688,7 @@
           <a:p>
             <a:fld id="{428859CC-B640-4DB3-BB6F-301CDED75AAD}" type="datetimeFigureOut">
               <a:rPr lang="sv-SE" smtClean="0"/>
-              <a:t>2020-02-07</a:t>
+              <a:t>2021-02-08</a:t>
             </a:fld>
             <a:endParaRPr lang="sv-SE"/>
           </a:p>
@@ -9397,7 +9397,7 @@
         <p:spPr>
           <a:xfrm>
             <a:off x="236623" y="2828492"/>
-            <a:ext cx="7039869" cy="2808461"/>
+            <a:ext cx="7039869" cy="3213700"/>
           </a:xfrm>
           <a:prstGeom prst="rect">
             <a:avLst/>
@@ -9625,7 +9625,7 @@
                 <a:latin typeface="Courier New" panose="02070309020205020404" pitchFamily="49" charset="0"/>
                 <a:cs typeface="Courier New" panose="02070309020205020404" pitchFamily="49" charset="0"/>
               </a:rPr>
-              <a:t>).launch{</a:t>
+              <a:t>){</a:t>
             </a:r>
           </a:p>
           <a:p>
@@ -9745,7 +9745,7 @@
                 <a:latin typeface="Courier New" panose="02070309020205020404" pitchFamily="49" charset="0"/>
                 <a:cs typeface="Courier New" panose="02070309020205020404" pitchFamily="49" charset="0"/>
               </a:rPr>
-              <a:t>).launch{</a:t>
+              <a:t>){</a:t>
             </a:r>
           </a:p>
           <a:p>
@@ -9796,6 +9796,31 @@
                 <a:cs typeface="Courier New" panose="02070309020205020404" pitchFamily="49" charset="0"/>
               </a:rPr>
               <a:t>}</a:t>
+            </a:r>
+          </a:p>
+          <a:p>
+            <a:pPr marL="0" indent="0">
+              <a:buNone/>
+            </a:pPr>
+            <a:r>
+              <a:rPr lang="en-US" sz="2000" dirty="0" err="1">
+                <a:solidFill>
+                  <a:schemeClr val="tx1"/>
+                </a:solidFill>
+                <a:latin typeface="Courier New" panose="02070309020205020404" pitchFamily="49" charset="0"/>
+                <a:cs typeface="Courier New" panose="02070309020205020404" pitchFamily="49" charset="0"/>
+              </a:rPr>
+              <a:t>println</a:t>
+            </a:r>
+            <a:r>
+              <a:rPr lang="en-US" sz="2000" dirty="0">
+                <a:solidFill>
+                  <a:schemeClr val="tx1"/>
+                </a:solidFill>
+                <a:latin typeface="Courier New" panose="02070309020205020404" pitchFamily="49" charset="0"/>
+                <a:cs typeface="Courier New" panose="02070309020205020404" pitchFamily="49" charset="0"/>
+              </a:rPr>
+              <a:t>("0")</a:t>
             </a:r>
           </a:p>
         </p:txBody>
@@ -9816,8 +9841,8 @@
         </p:nvSpPr>
         <p:spPr>
           <a:xfrm>
-            <a:off x="4944618" y="3831359"/>
-            <a:ext cx="7039869" cy="2808461"/>
+            <a:off x="6096000" y="3585525"/>
+            <a:ext cx="6030293" cy="3213700"/>
           </a:xfrm>
           <a:prstGeom prst="rect">
             <a:avLst/>
@@ -10045,7 +10070,7 @@
                 <a:latin typeface="Courier New" panose="02070309020205020404" pitchFamily="49" charset="0"/>
                 <a:cs typeface="Courier New" panose="02070309020205020404" pitchFamily="49" charset="0"/>
               </a:rPr>
-              <a:t>).launch{</a:t>
+              <a:t>){</a:t>
             </a:r>
           </a:p>
           <a:p>
@@ -10175,7 +10200,7 @@
                 <a:latin typeface="Courier New" panose="02070309020205020404" pitchFamily="49" charset="0"/>
                 <a:cs typeface="Courier New" panose="02070309020205020404" pitchFamily="49" charset="0"/>
               </a:rPr>
-              <a:t>).launch{</a:t>
+              <a:t>)){</a:t>
             </a:r>
           </a:p>
           <a:p>
@@ -10226,6 +10251,31 @@
                 <a:cs typeface="Courier New" panose="02070309020205020404" pitchFamily="49" charset="0"/>
               </a:rPr>
               <a:t>}</a:t>
+            </a:r>
+          </a:p>
+          <a:p>
+            <a:pPr marL="0" indent="0">
+              <a:buNone/>
+            </a:pPr>
+            <a:r>
+              <a:rPr lang="en-US" sz="2000" dirty="0" err="1">
+                <a:solidFill>
+                  <a:schemeClr val="tx1"/>
+                </a:solidFill>
+                <a:latin typeface="Courier New" panose="02070309020205020404" pitchFamily="49" charset="0"/>
+                <a:cs typeface="Courier New" panose="02070309020205020404" pitchFamily="49" charset="0"/>
+              </a:rPr>
+              <a:t>println</a:t>
+            </a:r>
+            <a:r>
+              <a:rPr lang="en-US" sz="2000" dirty="0">
+                <a:solidFill>
+                  <a:schemeClr val="tx1"/>
+                </a:solidFill>
+                <a:latin typeface="Courier New" panose="02070309020205020404" pitchFamily="49" charset="0"/>
+                <a:cs typeface="Courier New" panose="02070309020205020404" pitchFamily="49" charset="0"/>
+              </a:rPr>
+              <a:t>("0")</a:t>
             </a:r>
           </a:p>
         </p:txBody>
@@ -10234,1393 +10284,6 @@
     <p:extLst>
       <p:ext uri="{BB962C8B-B14F-4D97-AF65-F5344CB8AC3E}">
         <p14:creationId xmlns:p14="http://schemas.microsoft.com/office/powerpoint/2010/main" val="2094009833"/>
-      </p:ext>
-    </p:extLst>
-  </p:cSld>
-  <p:clrMapOvr>
-    <a:masterClrMapping/>
-  </p:clrMapOvr>
-  <p:timing>
-    <p:tnLst>
-      <p:par>
-        <p:cTn id="1" dur="indefinite" restart="never" nodeType="tmRoot">
-          <p:childTnLst>
-            <p:seq concurrent="1" nextAc="seek">
-              <p:cTn id="2" dur="indefinite" nodeType="mainSeq">
-                <p:childTnLst>
-                  <p:par>
-                    <p:cTn id="3" fill="hold">
-                      <p:stCondLst>
-                        <p:cond delay="indefinite"/>
-                      </p:stCondLst>
-                      <p:childTnLst>
-                        <p:par>
-                          <p:cTn id="4" fill="hold">
-                            <p:stCondLst>
-                              <p:cond delay="0"/>
-                            </p:stCondLst>
-                            <p:childTnLst>
-                              <p:par>
-                                <p:cTn id="5" presetID="1" presetClass="entr" presetSubtype="0" fill="hold" grpId="0" nodeType="clickEffect">
-                                  <p:stCondLst>
-                                    <p:cond delay="0"/>
-                                  </p:stCondLst>
-                                  <p:childTnLst>
-                                    <p:set>
-                                      <p:cBhvr>
-                                        <p:cTn id="6" dur="1" fill="hold">
-                                          <p:stCondLst>
-                                            <p:cond delay="0"/>
-                                          </p:stCondLst>
-                                        </p:cTn>
-                                        <p:tgtEl>
-                                          <p:spTgt spid="5">
-                                            <p:txEl>
-                                              <p:pRg st="0" end="0"/>
-                                            </p:txEl>
-                                          </p:spTgt>
-                                        </p:tgtEl>
-                                        <p:attrNameLst>
-                                          <p:attrName>style.visibility</p:attrName>
-                                        </p:attrNameLst>
-                                      </p:cBhvr>
-                                      <p:to>
-                                        <p:strVal val="visible"/>
-                                      </p:to>
-                                    </p:set>
-                                  </p:childTnLst>
-                                </p:cTn>
-                              </p:par>
-                            </p:childTnLst>
-                          </p:cTn>
-                        </p:par>
-                      </p:childTnLst>
-                    </p:cTn>
-                  </p:par>
-                  <p:par>
-                    <p:cTn id="7" fill="hold">
-                      <p:stCondLst>
-                        <p:cond delay="indefinite"/>
-                      </p:stCondLst>
-                      <p:childTnLst>
-                        <p:par>
-                          <p:cTn id="8" fill="hold">
-                            <p:stCondLst>
-                              <p:cond delay="0"/>
-                            </p:stCondLst>
-                            <p:childTnLst>
-                              <p:par>
-                                <p:cTn id="9" presetID="1" presetClass="entr" presetSubtype="0" fill="hold" grpId="0" nodeType="clickEffect">
-                                  <p:stCondLst>
-                                    <p:cond delay="0"/>
-                                  </p:stCondLst>
-                                  <p:childTnLst>
-                                    <p:set>
-                                      <p:cBhvr>
-                                        <p:cTn id="10" dur="1" fill="hold">
-                                          <p:stCondLst>
-                                            <p:cond delay="0"/>
-                                          </p:stCondLst>
-                                        </p:cTn>
-                                        <p:tgtEl>
-                                          <p:spTgt spid="6">
-                                            <p:bg/>
-                                          </p:spTgt>
-                                        </p:tgtEl>
-                                        <p:attrNameLst>
-                                          <p:attrName>style.visibility</p:attrName>
-                                        </p:attrNameLst>
-                                      </p:cBhvr>
-                                      <p:to>
-                                        <p:strVal val="visible"/>
-                                      </p:to>
-                                    </p:set>
-                                  </p:childTnLst>
-                                </p:cTn>
-                              </p:par>
-                            </p:childTnLst>
-                          </p:cTn>
-                        </p:par>
-                      </p:childTnLst>
-                    </p:cTn>
-                  </p:par>
-                  <p:par>
-                    <p:cTn id="11" fill="hold">
-                      <p:stCondLst>
-                        <p:cond delay="indefinite"/>
-                      </p:stCondLst>
-                      <p:childTnLst>
-                        <p:par>
-                          <p:cTn id="12" fill="hold">
-                            <p:stCondLst>
-                              <p:cond delay="0"/>
-                            </p:stCondLst>
-                            <p:childTnLst>
-                              <p:par>
-                                <p:cTn id="13" presetID="1" presetClass="entr" presetSubtype="0" fill="hold" nodeType="clickEffect">
-                                  <p:stCondLst>
-                                    <p:cond delay="0"/>
-                                  </p:stCondLst>
-                                  <p:childTnLst>
-                                    <p:set>
-                                      <p:cBhvr>
-                                        <p:cTn id="14" dur="1" fill="hold">
-                                          <p:stCondLst>
-                                            <p:cond delay="0"/>
-                                          </p:stCondLst>
-                                        </p:cTn>
-                                        <p:tgtEl>
-                                          <p:spTgt spid="6">
-                                            <p:txEl>
-                                              <p:pRg st="0" end="0"/>
-                                            </p:txEl>
-                                          </p:spTgt>
-                                        </p:tgtEl>
-                                        <p:attrNameLst>
-                                          <p:attrName>style.visibility</p:attrName>
-                                        </p:attrNameLst>
-                                      </p:cBhvr>
-                                      <p:to>
-                                        <p:strVal val="visible"/>
-                                      </p:to>
-                                    </p:set>
-                                  </p:childTnLst>
-                                </p:cTn>
-                              </p:par>
-                              <p:par>
-                                <p:cTn id="15" presetID="1" presetClass="entr" presetSubtype="0" fill="hold" nodeType="withEffect">
-                                  <p:stCondLst>
-                                    <p:cond delay="0"/>
-                                  </p:stCondLst>
-                                  <p:childTnLst>
-                                    <p:set>
-                                      <p:cBhvr>
-                                        <p:cTn id="16" dur="1" fill="hold">
-                                          <p:stCondLst>
-                                            <p:cond delay="0"/>
-                                          </p:stCondLst>
-                                        </p:cTn>
-                                        <p:tgtEl>
-                                          <p:spTgt spid="6">
-                                            <p:txEl>
-                                              <p:pRg st="3" end="3"/>
-                                            </p:txEl>
-                                          </p:spTgt>
-                                        </p:tgtEl>
-                                        <p:attrNameLst>
-                                          <p:attrName>style.visibility</p:attrName>
-                                        </p:attrNameLst>
-                                      </p:cBhvr>
-                                      <p:to>
-                                        <p:strVal val="visible"/>
-                                      </p:to>
-                                    </p:set>
-                                  </p:childTnLst>
-                                </p:cTn>
-                              </p:par>
-                            </p:childTnLst>
-                          </p:cTn>
-                        </p:par>
-                      </p:childTnLst>
-                    </p:cTn>
-                  </p:par>
-                  <p:par>
-                    <p:cTn id="17" fill="hold">
-                      <p:stCondLst>
-                        <p:cond delay="indefinite"/>
-                      </p:stCondLst>
-                      <p:childTnLst>
-                        <p:par>
-                          <p:cTn id="18" fill="hold">
-                            <p:stCondLst>
-                              <p:cond delay="0"/>
-                            </p:stCondLst>
-                            <p:childTnLst>
-                              <p:par>
-                                <p:cTn id="19" presetID="1" presetClass="entr" presetSubtype="0" fill="hold" nodeType="clickEffect">
-                                  <p:stCondLst>
-                                    <p:cond delay="0"/>
-                                  </p:stCondLst>
-                                  <p:childTnLst>
-                                    <p:set>
-                                      <p:cBhvr>
-                                        <p:cTn id="20" dur="1" fill="hold">
-                                          <p:stCondLst>
-                                            <p:cond delay="0"/>
-                                          </p:stCondLst>
-                                        </p:cTn>
-                                        <p:tgtEl>
-                                          <p:spTgt spid="6">
-                                            <p:txEl>
-                                              <p:pRg st="4" end="4"/>
-                                            </p:txEl>
-                                          </p:spTgt>
-                                        </p:tgtEl>
-                                        <p:attrNameLst>
-                                          <p:attrName>style.visibility</p:attrName>
-                                        </p:attrNameLst>
-                                      </p:cBhvr>
-                                      <p:to>
-                                        <p:strVal val="visible"/>
-                                      </p:to>
-                                    </p:set>
-                                  </p:childTnLst>
-                                </p:cTn>
-                              </p:par>
-                              <p:par>
-                                <p:cTn id="21" presetID="1" presetClass="entr" presetSubtype="0" fill="hold" nodeType="withEffect">
-                                  <p:stCondLst>
-                                    <p:cond delay="0"/>
-                                  </p:stCondLst>
-                                  <p:childTnLst>
-                                    <p:set>
-                                      <p:cBhvr>
-                                        <p:cTn id="22" dur="1" fill="hold">
-                                          <p:stCondLst>
-                                            <p:cond delay="0"/>
-                                          </p:stCondLst>
-                                        </p:cTn>
-                                        <p:tgtEl>
-                                          <p:spTgt spid="6">
-                                            <p:txEl>
-                                              <p:pRg st="6" end="6"/>
-                                            </p:txEl>
-                                          </p:spTgt>
-                                        </p:tgtEl>
-                                        <p:attrNameLst>
-                                          <p:attrName>style.visibility</p:attrName>
-                                        </p:attrNameLst>
-                                      </p:cBhvr>
-                                      <p:to>
-                                        <p:strVal val="visible"/>
-                                      </p:to>
-                                    </p:set>
-                                  </p:childTnLst>
-                                </p:cTn>
-                              </p:par>
-                            </p:childTnLst>
-                          </p:cTn>
-                        </p:par>
-                      </p:childTnLst>
-                    </p:cTn>
-                  </p:par>
-                  <p:par>
-                    <p:cTn id="23" fill="hold">
-                      <p:stCondLst>
-                        <p:cond delay="indefinite"/>
-                      </p:stCondLst>
-                      <p:childTnLst>
-                        <p:par>
-                          <p:cTn id="24" fill="hold">
-                            <p:stCondLst>
-                              <p:cond delay="0"/>
-                            </p:stCondLst>
-                            <p:childTnLst>
-                              <p:par>
-                                <p:cTn id="25" presetID="1" presetClass="entr" presetSubtype="0" fill="hold" nodeType="clickEffect">
-                                  <p:stCondLst>
-                                    <p:cond delay="0"/>
-                                  </p:stCondLst>
-                                  <p:childTnLst>
-                                    <p:set>
-                                      <p:cBhvr>
-                                        <p:cTn id="26" dur="1" fill="hold">
-                                          <p:stCondLst>
-                                            <p:cond delay="0"/>
-                                          </p:stCondLst>
-                                        </p:cTn>
-                                        <p:tgtEl>
-                                          <p:spTgt spid="6">
-                                            <p:txEl>
-                                              <p:pRg st="1" end="1"/>
-                                            </p:txEl>
-                                          </p:spTgt>
-                                        </p:tgtEl>
-                                        <p:attrNameLst>
-                                          <p:attrName>style.visibility</p:attrName>
-                                        </p:attrNameLst>
-                                      </p:cBhvr>
-                                      <p:to>
-                                        <p:strVal val="visible"/>
-                                      </p:to>
-                                    </p:set>
-                                  </p:childTnLst>
-                                </p:cTn>
-                              </p:par>
-                            </p:childTnLst>
-                          </p:cTn>
-                        </p:par>
-                      </p:childTnLst>
-                    </p:cTn>
-                  </p:par>
-                  <p:par>
-                    <p:cTn id="27" fill="hold">
-                      <p:stCondLst>
-                        <p:cond delay="indefinite"/>
-                      </p:stCondLst>
-                      <p:childTnLst>
-                        <p:par>
-                          <p:cTn id="28" fill="hold">
-                            <p:stCondLst>
-                              <p:cond delay="0"/>
-                            </p:stCondLst>
-                            <p:childTnLst>
-                              <p:par>
-                                <p:cTn id="29" presetID="1" presetClass="entr" presetSubtype="0" fill="hold" nodeType="clickEffect">
-                                  <p:stCondLst>
-                                    <p:cond delay="0"/>
-                                  </p:stCondLst>
-                                  <p:childTnLst>
-                                    <p:set>
-                                      <p:cBhvr>
-                                        <p:cTn id="30" dur="1" fill="hold">
-                                          <p:stCondLst>
-                                            <p:cond delay="0"/>
-                                          </p:stCondLst>
-                                        </p:cTn>
-                                        <p:tgtEl>
-                                          <p:spTgt spid="6">
-                                            <p:txEl>
-                                              <p:pRg st="5" end="5"/>
-                                            </p:txEl>
-                                          </p:spTgt>
-                                        </p:tgtEl>
-                                        <p:attrNameLst>
-                                          <p:attrName>style.visibility</p:attrName>
-                                        </p:attrNameLst>
-                                      </p:cBhvr>
-                                      <p:to>
-                                        <p:strVal val="visible"/>
-                                      </p:to>
-                                    </p:set>
-                                  </p:childTnLst>
-                                </p:cTn>
-                              </p:par>
-                            </p:childTnLst>
-                          </p:cTn>
-                        </p:par>
-                      </p:childTnLst>
-                    </p:cTn>
-                  </p:par>
-                  <p:par>
-                    <p:cTn id="31" fill="hold">
-                      <p:stCondLst>
-                        <p:cond delay="indefinite"/>
-                      </p:stCondLst>
-                      <p:childTnLst>
-                        <p:par>
-                          <p:cTn id="32" fill="hold">
-                            <p:stCondLst>
-                              <p:cond delay="0"/>
-                            </p:stCondLst>
-                            <p:childTnLst>
-                              <p:par>
-                                <p:cTn id="33" presetID="1" presetClass="entr" presetSubtype="0" fill="hold" nodeType="clickEffect">
-                                  <p:stCondLst>
-                                    <p:cond delay="0"/>
-                                  </p:stCondLst>
-                                  <p:childTnLst>
-                                    <p:set>
-                                      <p:cBhvr>
-                                        <p:cTn id="34" dur="1" fill="hold">
-                                          <p:stCondLst>
-                                            <p:cond delay="0"/>
-                                          </p:stCondLst>
-                                        </p:cTn>
-                                        <p:tgtEl>
-                                          <p:spTgt spid="6">
-                                            <p:txEl>
-                                              <p:pRg st="2" end="2"/>
-                                            </p:txEl>
-                                          </p:spTgt>
-                                        </p:tgtEl>
-                                        <p:attrNameLst>
-                                          <p:attrName>style.visibility</p:attrName>
-                                        </p:attrNameLst>
-                                      </p:cBhvr>
-                                      <p:to>
-                                        <p:strVal val="visible"/>
-                                      </p:to>
-                                    </p:set>
-                                  </p:childTnLst>
-                                </p:cTn>
-                              </p:par>
-                            </p:childTnLst>
-                          </p:cTn>
-                        </p:par>
-                      </p:childTnLst>
-                    </p:cTn>
-                  </p:par>
-                  <p:par>
-                    <p:cTn id="35" fill="hold">
-                      <p:stCondLst>
-                        <p:cond delay="indefinite"/>
-                      </p:stCondLst>
-                      <p:childTnLst>
-                        <p:par>
-                          <p:cTn id="36" fill="hold">
-                            <p:stCondLst>
-                              <p:cond delay="0"/>
-                            </p:stCondLst>
-                            <p:childTnLst>
-                              <p:par>
-                                <p:cTn id="37" presetID="1" presetClass="entr" presetSubtype="0" fill="hold" grpId="0" nodeType="clickEffect">
-                                  <p:stCondLst>
-                                    <p:cond delay="0"/>
-                                  </p:stCondLst>
-                                  <p:childTnLst>
-                                    <p:set>
-                                      <p:cBhvr>
-                                        <p:cTn id="38" dur="1" fill="hold">
-                                          <p:stCondLst>
-                                            <p:cond delay="0"/>
-                                          </p:stCondLst>
-                                        </p:cTn>
-                                        <p:tgtEl>
-                                          <p:spTgt spid="7">
-                                            <p:bg/>
-                                          </p:spTgt>
-                                        </p:tgtEl>
-                                        <p:attrNameLst>
-                                          <p:attrName>style.visibility</p:attrName>
-                                        </p:attrNameLst>
-                                      </p:cBhvr>
-                                      <p:to>
-                                        <p:strVal val="visible"/>
-                                      </p:to>
-                                    </p:set>
-                                  </p:childTnLst>
-                                </p:cTn>
-                              </p:par>
-                            </p:childTnLst>
-                          </p:cTn>
-                        </p:par>
-                      </p:childTnLst>
-                    </p:cTn>
-                  </p:par>
-                  <p:par>
-                    <p:cTn id="39" fill="hold">
-                      <p:stCondLst>
-                        <p:cond delay="indefinite"/>
-                      </p:stCondLst>
-                      <p:childTnLst>
-                        <p:par>
-                          <p:cTn id="40" fill="hold">
-                            <p:stCondLst>
-                              <p:cond delay="0"/>
-                            </p:stCondLst>
-                            <p:childTnLst>
-                              <p:par>
-                                <p:cTn id="41" presetID="1" presetClass="entr" presetSubtype="0" fill="hold" nodeType="clickEffect">
-                                  <p:stCondLst>
-                                    <p:cond delay="0"/>
-                                  </p:stCondLst>
-                                  <p:childTnLst>
-                                    <p:set>
-                                      <p:cBhvr>
-                                        <p:cTn id="42" dur="1" fill="hold">
-                                          <p:stCondLst>
-                                            <p:cond delay="0"/>
-                                          </p:stCondLst>
-                                        </p:cTn>
-                                        <p:tgtEl>
-                                          <p:spTgt spid="7">
-                                            <p:txEl>
-                                              <p:pRg st="0" end="0"/>
-                                            </p:txEl>
-                                          </p:spTgt>
-                                        </p:tgtEl>
-                                        <p:attrNameLst>
-                                          <p:attrName>style.visibility</p:attrName>
-                                        </p:attrNameLst>
-                                      </p:cBhvr>
-                                      <p:to>
-                                        <p:strVal val="visible"/>
-                                      </p:to>
-                                    </p:set>
-                                  </p:childTnLst>
-                                </p:cTn>
-                              </p:par>
-                              <p:par>
-                                <p:cTn id="43" presetID="1" presetClass="entr" presetSubtype="0" fill="hold" nodeType="withEffect">
-                                  <p:stCondLst>
-                                    <p:cond delay="0"/>
-                                  </p:stCondLst>
-                                  <p:childTnLst>
-                                    <p:set>
-                                      <p:cBhvr>
-                                        <p:cTn id="44" dur="1" fill="hold">
-                                          <p:stCondLst>
-                                            <p:cond delay="0"/>
-                                          </p:stCondLst>
-                                        </p:cTn>
-                                        <p:tgtEl>
-                                          <p:spTgt spid="7">
-                                            <p:txEl>
-                                              <p:pRg st="3" end="3"/>
-                                            </p:txEl>
-                                          </p:spTgt>
-                                        </p:tgtEl>
-                                        <p:attrNameLst>
-                                          <p:attrName>style.visibility</p:attrName>
-                                        </p:attrNameLst>
-                                      </p:cBhvr>
-                                      <p:to>
-                                        <p:strVal val="visible"/>
-                                      </p:to>
-                                    </p:set>
-                                  </p:childTnLst>
-                                </p:cTn>
-                              </p:par>
-                            </p:childTnLst>
-                          </p:cTn>
-                        </p:par>
-                      </p:childTnLst>
-                    </p:cTn>
-                  </p:par>
-                  <p:par>
-                    <p:cTn id="45" fill="hold">
-                      <p:stCondLst>
-                        <p:cond delay="indefinite"/>
-                      </p:stCondLst>
-                      <p:childTnLst>
-                        <p:par>
-                          <p:cTn id="46" fill="hold">
-                            <p:stCondLst>
-                              <p:cond delay="0"/>
-                            </p:stCondLst>
-                            <p:childTnLst>
-                              <p:par>
-                                <p:cTn id="47" presetID="1" presetClass="entr" presetSubtype="0" fill="hold" nodeType="clickEffect">
-                                  <p:stCondLst>
-                                    <p:cond delay="0"/>
-                                  </p:stCondLst>
-                                  <p:childTnLst>
-                                    <p:set>
-                                      <p:cBhvr>
-                                        <p:cTn id="48" dur="1" fill="hold">
-                                          <p:stCondLst>
-                                            <p:cond delay="0"/>
-                                          </p:stCondLst>
-                                        </p:cTn>
-                                        <p:tgtEl>
-                                          <p:spTgt spid="7">
-                                            <p:txEl>
-                                              <p:pRg st="4" end="4"/>
-                                            </p:txEl>
-                                          </p:spTgt>
-                                        </p:tgtEl>
-                                        <p:attrNameLst>
-                                          <p:attrName>style.visibility</p:attrName>
-                                        </p:attrNameLst>
-                                      </p:cBhvr>
-                                      <p:to>
-                                        <p:strVal val="visible"/>
-                                      </p:to>
-                                    </p:set>
-                                  </p:childTnLst>
-                                </p:cTn>
-                              </p:par>
-                              <p:par>
-                                <p:cTn id="49" presetID="1" presetClass="entr" presetSubtype="0" fill="hold" nodeType="withEffect">
-                                  <p:stCondLst>
-                                    <p:cond delay="0"/>
-                                  </p:stCondLst>
-                                  <p:childTnLst>
-                                    <p:set>
-                                      <p:cBhvr>
-                                        <p:cTn id="50" dur="1" fill="hold">
-                                          <p:stCondLst>
-                                            <p:cond delay="0"/>
-                                          </p:stCondLst>
-                                        </p:cTn>
-                                        <p:tgtEl>
-                                          <p:spTgt spid="7">
-                                            <p:txEl>
-                                              <p:pRg st="6" end="6"/>
-                                            </p:txEl>
-                                          </p:spTgt>
-                                        </p:tgtEl>
-                                        <p:attrNameLst>
-                                          <p:attrName>style.visibility</p:attrName>
-                                        </p:attrNameLst>
-                                      </p:cBhvr>
-                                      <p:to>
-                                        <p:strVal val="visible"/>
-                                      </p:to>
-                                    </p:set>
-                                  </p:childTnLst>
-                                </p:cTn>
-                              </p:par>
-                            </p:childTnLst>
-                          </p:cTn>
-                        </p:par>
-                      </p:childTnLst>
-                    </p:cTn>
-                  </p:par>
-                  <p:par>
-                    <p:cTn id="51" fill="hold">
-                      <p:stCondLst>
-                        <p:cond delay="indefinite"/>
-                      </p:stCondLst>
-                      <p:childTnLst>
-                        <p:par>
-                          <p:cTn id="52" fill="hold">
-                            <p:stCondLst>
-                              <p:cond delay="0"/>
-                            </p:stCondLst>
-                            <p:childTnLst>
-                              <p:par>
-                                <p:cTn id="53" presetID="1" presetClass="entr" presetSubtype="0" fill="hold" nodeType="clickEffect">
-                                  <p:stCondLst>
-                                    <p:cond delay="0"/>
-                                  </p:stCondLst>
-                                  <p:childTnLst>
-                                    <p:set>
-                                      <p:cBhvr>
-                                        <p:cTn id="54" dur="1" fill="hold">
-                                          <p:stCondLst>
-                                            <p:cond delay="0"/>
-                                          </p:stCondLst>
-                                        </p:cTn>
-                                        <p:tgtEl>
-                                          <p:spTgt spid="7">
-                                            <p:txEl>
-                                              <p:pRg st="1" end="1"/>
-                                            </p:txEl>
-                                          </p:spTgt>
-                                        </p:tgtEl>
-                                        <p:attrNameLst>
-                                          <p:attrName>style.visibility</p:attrName>
-                                        </p:attrNameLst>
-                                      </p:cBhvr>
-                                      <p:to>
-                                        <p:strVal val="visible"/>
-                                      </p:to>
-                                    </p:set>
-                                  </p:childTnLst>
-                                </p:cTn>
-                              </p:par>
-                            </p:childTnLst>
-                          </p:cTn>
-                        </p:par>
-                      </p:childTnLst>
-                    </p:cTn>
-                  </p:par>
-                  <p:par>
-                    <p:cTn id="55" fill="hold">
-                      <p:stCondLst>
-                        <p:cond delay="indefinite"/>
-                      </p:stCondLst>
-                      <p:childTnLst>
-                        <p:par>
-                          <p:cTn id="56" fill="hold">
-                            <p:stCondLst>
-                              <p:cond delay="0"/>
-                            </p:stCondLst>
-                            <p:childTnLst>
-                              <p:par>
-                                <p:cTn id="57" presetID="1" presetClass="entr" presetSubtype="0" fill="hold" nodeType="clickEffect">
-                                  <p:stCondLst>
-                                    <p:cond delay="0"/>
-                                  </p:stCondLst>
-                                  <p:childTnLst>
-                                    <p:set>
-                                      <p:cBhvr>
-                                        <p:cTn id="58" dur="1" fill="hold">
-                                          <p:stCondLst>
-                                            <p:cond delay="0"/>
-                                          </p:stCondLst>
-                                        </p:cTn>
-                                        <p:tgtEl>
-                                          <p:spTgt spid="7">
-                                            <p:txEl>
-                                              <p:pRg st="2" end="2"/>
-                                            </p:txEl>
-                                          </p:spTgt>
-                                        </p:tgtEl>
-                                        <p:attrNameLst>
-                                          <p:attrName>style.visibility</p:attrName>
-                                        </p:attrNameLst>
-                                      </p:cBhvr>
-                                      <p:to>
-                                        <p:strVal val="visible"/>
-                                      </p:to>
-                                    </p:set>
-                                  </p:childTnLst>
-                                </p:cTn>
-                              </p:par>
-                            </p:childTnLst>
-                          </p:cTn>
-                        </p:par>
-                      </p:childTnLst>
-                    </p:cTn>
-                  </p:par>
-                  <p:par>
-                    <p:cTn id="59" fill="hold">
-                      <p:stCondLst>
-                        <p:cond delay="indefinite"/>
-                      </p:stCondLst>
-                      <p:childTnLst>
-                        <p:par>
-                          <p:cTn id="60" fill="hold">
-                            <p:stCondLst>
-                              <p:cond delay="0"/>
-                            </p:stCondLst>
-                            <p:childTnLst>
-                              <p:par>
-                                <p:cTn id="61" presetID="1" presetClass="entr" presetSubtype="0" fill="hold" nodeType="clickEffect">
-                                  <p:stCondLst>
-                                    <p:cond delay="0"/>
-                                  </p:stCondLst>
-                                  <p:childTnLst>
-                                    <p:set>
-                                      <p:cBhvr>
-                                        <p:cTn id="62" dur="1" fill="hold">
-                                          <p:stCondLst>
-                                            <p:cond delay="0"/>
-                                          </p:stCondLst>
-                                        </p:cTn>
-                                        <p:tgtEl>
-                                          <p:spTgt spid="7">
-                                            <p:txEl>
-                                              <p:pRg st="5" end="5"/>
-                                            </p:txEl>
-                                          </p:spTgt>
-                                        </p:tgtEl>
-                                        <p:attrNameLst>
-                                          <p:attrName>style.visibility</p:attrName>
-                                        </p:attrNameLst>
-                                      </p:cBhvr>
-                                      <p:to>
-                                        <p:strVal val="visible"/>
-                                      </p:to>
-                                    </p:set>
-                                  </p:childTnLst>
-                                </p:cTn>
-                              </p:par>
-                            </p:childTnLst>
-                          </p:cTn>
-                        </p:par>
-                      </p:childTnLst>
-                    </p:cTn>
-                  </p:par>
-                </p:childTnLst>
-              </p:cTn>
-              <p:prevCondLst>
-                <p:cond evt="onPrev" delay="0">
-                  <p:tgtEl>
-                    <p:sldTgt/>
-                  </p:tgtEl>
-                </p:cond>
-              </p:prevCondLst>
-              <p:nextCondLst>
-                <p:cond evt="onNext" delay="0">
-                  <p:tgtEl>
-                    <p:sldTgt/>
-                  </p:tgtEl>
-                </p:cond>
-              </p:nextCondLst>
-            </p:seq>
-          </p:childTnLst>
-        </p:cTn>
-      </p:par>
-    </p:tnLst>
-    <p:bldLst>
-      <p:bldP spid="5" grpId="0" build="p"/>
-      <p:bldP spid="6" grpId="0" build="p" animBg="1"/>
-      <p:bldP spid="7" grpId="0" build="p" animBg="1"/>
-    </p:bldLst>
-  </p:timing>
-</p:sld>
-</file>
-
-<file path=ppt/slides/slide12.xml><?xml version="1.0" encoding="utf-8"?>
-<p:sld xmlns:a="http://schemas.openxmlformats.org/drawingml/2006/main" xmlns:r="http://schemas.openxmlformats.org/officeDocument/2006/relationships" xmlns:p="http://schemas.openxmlformats.org/presentationml/2006/main">
-  <p:cSld>
-    <p:spTree>
-      <p:nvGrpSpPr>
-        <p:cNvPr id="1" name=""/>
-        <p:cNvGrpSpPr/>
-        <p:nvPr/>
-      </p:nvGrpSpPr>
-      <p:grpSpPr>
-        <a:xfrm>
-          <a:off x="0" y="0"/>
-          <a:ext cx="0" cy="0"/>
-          <a:chOff x="0" y="0"/>
-          <a:chExt cx="0" cy="0"/>
-        </a:xfrm>
-      </p:grpSpPr>
-      <p:sp>
-        <p:nvSpPr>
-          <p:cNvPr id="2" name="Title 1"/>
-          <p:cNvSpPr>
-            <a:spLocks noGrp="1"/>
-          </p:cNvSpPr>
-          <p:nvPr>
-            <p:ph type="title"/>
-          </p:nvPr>
-        </p:nvSpPr>
-        <p:spPr/>
-        <p:txBody>
-          <a:bodyPr/>
-          <a:lstStyle/>
-          <a:p>
-            <a:r>
-              <a:rPr lang="en-US" dirty="0"/>
-              <a:t>Suspending functions</a:t>
-            </a:r>
-          </a:p>
-        </p:txBody>
-      </p:sp>
-      <p:sp>
-        <p:nvSpPr>
-          <p:cNvPr id="5" name="Content Placeholder 2">
-            <a:extLst>
-              <a:ext uri="{FF2B5EF4-FFF2-40B4-BE49-F238E27FC236}">
-                <a16:creationId xmlns:a16="http://schemas.microsoft.com/office/drawing/2014/main" id="{9AF0E311-5F72-4E3F-A2F9-8F31E389888B}"/>
-              </a:ext>
-            </a:extLst>
-          </p:cNvPr>
-          <p:cNvSpPr>
-            <a:spLocks noGrp="1"/>
-          </p:cNvSpPr>
-          <p:nvPr>
-            <p:ph idx="1"/>
-          </p:nvPr>
-        </p:nvSpPr>
-        <p:spPr>
-          <a:xfrm>
-            <a:off x="838200" y="1825625"/>
-            <a:ext cx="11080898" cy="867930"/>
-          </a:xfrm>
-        </p:spPr>
-        <p:txBody>
-          <a:bodyPr wrap="square">
-            <a:spAutoFit/>
-          </a:bodyPr>
-          <a:lstStyle/>
-          <a:p>
-            <a:pPr marL="0" indent="0">
-              <a:buNone/>
-            </a:pPr>
-            <a:r>
-              <a:rPr lang="en-US" dirty="0"/>
-              <a:t>Suspend functions can only be used in coroutines and other suspend functions.</a:t>
-            </a:r>
-            <a:endParaRPr lang="en-US" dirty="0">
-              <a:latin typeface="+mn-lt"/>
-            </a:endParaRPr>
-          </a:p>
-        </p:txBody>
-      </p:sp>
-      <p:sp>
-        <p:nvSpPr>
-          <p:cNvPr id="6" name="Content Placeholder 3">
-            <a:extLst>
-              <a:ext uri="{FF2B5EF4-FFF2-40B4-BE49-F238E27FC236}">
-                <a16:creationId xmlns:a16="http://schemas.microsoft.com/office/drawing/2014/main" id="{4C78578D-DD09-466E-9732-2AA6C90B2D71}"/>
-              </a:ext>
-            </a:extLst>
-          </p:cNvPr>
-          <p:cNvSpPr txBox="1">
-            <a:spLocks/>
-          </p:cNvSpPr>
-          <p:nvPr/>
-        </p:nvSpPr>
-        <p:spPr>
-          <a:xfrm>
-            <a:off x="1056167" y="2693555"/>
-            <a:ext cx="10644963" cy="4024179"/>
-          </a:xfrm>
-          <a:prstGeom prst="rect">
-            <a:avLst/>
-          </a:prstGeom>
-          <a:solidFill>
-            <a:schemeClr val="bg1">
-              <a:lumMod val="95000"/>
-            </a:schemeClr>
-          </a:solidFill>
-          <a:effectLst>
-            <a:glow rad="139700">
-              <a:schemeClr val="bg1">
-                <a:lumMod val="95000"/>
-              </a:schemeClr>
-            </a:glow>
-          </a:effectLst>
-        </p:spPr>
-        <p:txBody>
-          <a:bodyPr vert="horz" wrap="square" lIns="91440" tIns="45720" rIns="91440" bIns="45720" rtlCol="0">
-            <a:spAutoFit/>
-          </a:bodyPr>
-          <a:lstStyle>
-            <a:lvl1pPr marL="228600" indent="-228600" algn="l" defTabSz="914400" rtl="0" eaLnBrk="1" latinLnBrk="0" hangingPunct="1">
-              <a:lnSpc>
-                <a:spcPct val="90000"/>
-              </a:lnSpc>
-              <a:spcBef>
-                <a:spcPts val="1000"/>
-              </a:spcBef>
-              <a:buFont typeface="Arial" panose="020B0604020202020204" pitchFamily="34" charset="0"/>
-              <a:buChar char="•"/>
-              <a:defRPr sz="2800" kern="1200">
-                <a:solidFill>
-                  <a:schemeClr val="bg1"/>
-                </a:solidFill>
-                <a:latin typeface="BentonSans Medium" panose="02000603000000020004" pitchFamily="50" charset="0"/>
-                <a:ea typeface="+mn-ea"/>
-                <a:cs typeface="+mn-cs"/>
-              </a:defRPr>
-            </a:lvl1pPr>
-            <a:lvl2pPr marL="685800" indent="-228600" algn="l" defTabSz="914400" rtl="0" eaLnBrk="1" latinLnBrk="0" hangingPunct="1">
-              <a:lnSpc>
-                <a:spcPct val="90000"/>
-              </a:lnSpc>
-              <a:spcBef>
-                <a:spcPts val="500"/>
-              </a:spcBef>
-              <a:buFont typeface="Arial" panose="020B0604020202020204" pitchFamily="34" charset="0"/>
-              <a:buChar char="•"/>
-              <a:defRPr sz="2400" kern="1200">
-                <a:solidFill>
-                  <a:schemeClr val="bg1"/>
-                </a:solidFill>
-                <a:latin typeface="BentonSans Regular" panose="02000503000000020004" pitchFamily="50" charset="0"/>
-                <a:ea typeface="+mn-ea"/>
-                <a:cs typeface="+mn-cs"/>
-              </a:defRPr>
-            </a:lvl2pPr>
-            <a:lvl3pPr marL="1143000" indent="-228600" algn="l" defTabSz="914400" rtl="0" eaLnBrk="1" latinLnBrk="0" hangingPunct="1">
-              <a:lnSpc>
-                <a:spcPct val="90000"/>
-              </a:lnSpc>
-              <a:spcBef>
-                <a:spcPts val="500"/>
-              </a:spcBef>
-              <a:buFont typeface="Arial" panose="020B0604020202020204" pitchFamily="34" charset="0"/>
-              <a:buChar char="•"/>
-              <a:defRPr sz="2000" kern="1200">
-                <a:solidFill>
-                  <a:schemeClr val="bg1"/>
-                </a:solidFill>
-                <a:latin typeface="BentonSans Regular" panose="02000503000000020004" pitchFamily="50" charset="0"/>
-                <a:ea typeface="+mn-ea"/>
-                <a:cs typeface="+mn-cs"/>
-              </a:defRPr>
-            </a:lvl3pPr>
-            <a:lvl4pPr marL="1600200" indent="-228600" algn="l" defTabSz="914400" rtl="0" eaLnBrk="1" latinLnBrk="0" hangingPunct="1">
-              <a:lnSpc>
-                <a:spcPct val="90000"/>
-              </a:lnSpc>
-              <a:spcBef>
-                <a:spcPts val="500"/>
-              </a:spcBef>
-              <a:buFont typeface="Arial" panose="020B0604020202020204" pitchFamily="34" charset="0"/>
-              <a:buChar char="•"/>
-              <a:defRPr sz="1800" kern="1200">
-                <a:solidFill>
-                  <a:schemeClr val="bg1"/>
-                </a:solidFill>
-                <a:latin typeface="BentonSans Regular" panose="02000503000000020004" pitchFamily="50" charset="0"/>
-                <a:ea typeface="+mn-ea"/>
-                <a:cs typeface="+mn-cs"/>
-              </a:defRPr>
-            </a:lvl4pPr>
-            <a:lvl5pPr marL="2057400" indent="-228600" algn="l" defTabSz="914400" rtl="0" eaLnBrk="1" latinLnBrk="0" hangingPunct="1">
-              <a:lnSpc>
-                <a:spcPct val="90000"/>
-              </a:lnSpc>
-              <a:spcBef>
-                <a:spcPts val="500"/>
-              </a:spcBef>
-              <a:buFont typeface="Arial" panose="020B0604020202020204" pitchFamily="34" charset="0"/>
-              <a:buChar char="•"/>
-              <a:defRPr sz="1800" kern="1200">
-                <a:solidFill>
-                  <a:schemeClr val="bg1"/>
-                </a:solidFill>
-                <a:latin typeface="BentonSans Regular" panose="02000503000000020004" pitchFamily="50" charset="0"/>
-                <a:ea typeface="+mn-ea"/>
-                <a:cs typeface="+mn-cs"/>
-              </a:defRPr>
-            </a:lvl5pPr>
-            <a:lvl6pPr marL="2514600" indent="-228600" algn="l" defTabSz="914400" rtl="0" eaLnBrk="1" latinLnBrk="0" hangingPunct="1">
-              <a:lnSpc>
-                <a:spcPct val="90000"/>
-              </a:lnSpc>
-              <a:spcBef>
-                <a:spcPts val="500"/>
-              </a:spcBef>
-              <a:buFont typeface="Arial" panose="020B0604020202020204" pitchFamily="34" charset="0"/>
-              <a:buChar char="•"/>
-              <a:defRPr sz="1800" kern="1200">
-                <a:solidFill>
-                  <a:schemeClr val="tx1"/>
-                </a:solidFill>
-                <a:latin typeface="+mn-lt"/>
-                <a:ea typeface="+mn-ea"/>
-                <a:cs typeface="+mn-cs"/>
-              </a:defRPr>
-            </a:lvl6pPr>
-            <a:lvl7pPr marL="2971800" indent="-228600" algn="l" defTabSz="914400" rtl="0" eaLnBrk="1" latinLnBrk="0" hangingPunct="1">
-              <a:lnSpc>
-                <a:spcPct val="90000"/>
-              </a:lnSpc>
-              <a:spcBef>
-                <a:spcPts val="500"/>
-              </a:spcBef>
-              <a:buFont typeface="Arial" panose="020B0604020202020204" pitchFamily="34" charset="0"/>
-              <a:buChar char="•"/>
-              <a:defRPr sz="1800" kern="1200">
-                <a:solidFill>
-                  <a:schemeClr val="tx1"/>
-                </a:solidFill>
-                <a:latin typeface="+mn-lt"/>
-                <a:ea typeface="+mn-ea"/>
-                <a:cs typeface="+mn-cs"/>
-              </a:defRPr>
-            </a:lvl7pPr>
-            <a:lvl8pPr marL="3429000" indent="-228600" algn="l" defTabSz="914400" rtl="0" eaLnBrk="1" latinLnBrk="0" hangingPunct="1">
-              <a:lnSpc>
-                <a:spcPct val="90000"/>
-              </a:lnSpc>
-              <a:spcBef>
-                <a:spcPts val="500"/>
-              </a:spcBef>
-              <a:buFont typeface="Arial" panose="020B0604020202020204" pitchFamily="34" charset="0"/>
-              <a:buChar char="•"/>
-              <a:defRPr sz="1800" kern="1200">
-                <a:solidFill>
-                  <a:schemeClr val="tx1"/>
-                </a:solidFill>
-                <a:latin typeface="+mn-lt"/>
-                <a:ea typeface="+mn-ea"/>
-                <a:cs typeface="+mn-cs"/>
-              </a:defRPr>
-            </a:lvl8pPr>
-            <a:lvl9pPr marL="3886200" indent="-228600" algn="l" defTabSz="914400" rtl="0" eaLnBrk="1" latinLnBrk="0" hangingPunct="1">
-              <a:lnSpc>
-                <a:spcPct val="90000"/>
-              </a:lnSpc>
-              <a:spcBef>
-                <a:spcPts val="500"/>
-              </a:spcBef>
-              <a:buFont typeface="Arial" panose="020B0604020202020204" pitchFamily="34" charset="0"/>
-              <a:buChar char="•"/>
-              <a:defRPr sz="1800" kern="1200">
-                <a:solidFill>
-                  <a:schemeClr val="tx1"/>
-                </a:solidFill>
-                <a:latin typeface="+mn-lt"/>
-                <a:ea typeface="+mn-ea"/>
-                <a:cs typeface="+mn-cs"/>
-              </a:defRPr>
-            </a:lvl9pPr>
-          </a:lstStyle>
-          <a:p>
-            <a:pPr marL="0" indent="0">
-              <a:buNone/>
-            </a:pPr>
-            <a:r>
-              <a:rPr lang="en-US" sz="2000" b="1" dirty="0">
-                <a:solidFill>
-                  <a:schemeClr val="tx2"/>
-                </a:solidFill>
-                <a:latin typeface="Courier New" panose="02070309020205020404" pitchFamily="49" charset="0"/>
-                <a:cs typeface="Courier New" panose="02070309020205020404" pitchFamily="49" charset="0"/>
-              </a:rPr>
-              <a:t>suspend fun </a:t>
-            </a:r>
-            <a:r>
-              <a:rPr lang="en-US" sz="2000" dirty="0" err="1">
-                <a:solidFill>
-                  <a:schemeClr val="tx1"/>
-                </a:solidFill>
-                <a:latin typeface="Courier New" panose="02070309020205020404" pitchFamily="49" charset="0"/>
-                <a:cs typeface="Courier New" panose="02070309020205020404" pitchFamily="49" charset="0"/>
-              </a:rPr>
-              <a:t>waitAndPrint</a:t>
-            </a:r>
-            <a:r>
-              <a:rPr lang="en-US" sz="2000" dirty="0">
-                <a:solidFill>
-                  <a:schemeClr val="tx1"/>
-                </a:solidFill>
-                <a:latin typeface="Courier New" panose="02070309020205020404" pitchFamily="49" charset="0"/>
-                <a:cs typeface="Courier New" panose="02070309020205020404" pitchFamily="49" charset="0"/>
-              </a:rPr>
-              <a:t>(time: Long, message: String): Unit {</a:t>
-            </a:r>
-          </a:p>
-          <a:p>
-            <a:pPr marL="0" indent="0">
-              <a:buNone/>
-            </a:pPr>
-            <a:r>
-              <a:rPr lang="en-US" sz="2000" dirty="0">
-                <a:solidFill>
-                  <a:schemeClr val="tx1"/>
-                </a:solidFill>
-                <a:latin typeface="Courier New" panose="02070309020205020404" pitchFamily="49" charset="0"/>
-                <a:cs typeface="Courier New" panose="02070309020205020404" pitchFamily="49" charset="0"/>
-              </a:rPr>
-              <a:t>  delay(time)</a:t>
-            </a:r>
-            <a:endParaRPr lang="en-US" sz="2000" i="1" dirty="0">
-              <a:solidFill>
-                <a:schemeClr val="accent6"/>
-              </a:solidFill>
-              <a:latin typeface="Courier New" panose="02070309020205020404" pitchFamily="49" charset="0"/>
-              <a:cs typeface="Courier New" panose="02070309020205020404" pitchFamily="49" charset="0"/>
-            </a:endParaRPr>
-          </a:p>
-          <a:p>
-            <a:pPr marL="0" indent="0">
-              <a:buNone/>
-            </a:pPr>
-            <a:r>
-              <a:rPr lang="en-US" sz="2000" dirty="0">
-                <a:solidFill>
-                  <a:schemeClr val="tx1"/>
-                </a:solidFill>
-                <a:latin typeface="Courier New" panose="02070309020205020404" pitchFamily="49" charset="0"/>
-                <a:cs typeface="Courier New" panose="02070309020205020404" pitchFamily="49" charset="0"/>
-              </a:rPr>
-              <a:t>  </a:t>
-            </a:r>
-            <a:r>
-              <a:rPr lang="en-US" sz="2000" dirty="0" err="1">
-                <a:solidFill>
-                  <a:schemeClr val="tx1"/>
-                </a:solidFill>
-                <a:latin typeface="Courier New" panose="02070309020205020404" pitchFamily="49" charset="0"/>
-                <a:cs typeface="Courier New" panose="02070309020205020404" pitchFamily="49" charset="0"/>
-              </a:rPr>
-              <a:t>println</a:t>
-            </a:r>
-            <a:r>
-              <a:rPr lang="en-US" sz="2000" dirty="0">
-                <a:solidFill>
-                  <a:schemeClr val="tx1"/>
-                </a:solidFill>
-                <a:latin typeface="Courier New" panose="02070309020205020404" pitchFamily="49" charset="0"/>
-                <a:cs typeface="Courier New" panose="02070309020205020404" pitchFamily="49" charset="0"/>
-              </a:rPr>
-              <a:t>(message)</a:t>
-            </a:r>
-          </a:p>
-          <a:p>
-            <a:pPr marL="0" indent="0">
-              <a:buNone/>
-            </a:pPr>
-            <a:r>
-              <a:rPr lang="en-US" sz="2000" dirty="0">
-                <a:solidFill>
-                  <a:schemeClr val="tx1"/>
-                </a:solidFill>
-                <a:latin typeface="Courier New" panose="02070309020205020404" pitchFamily="49" charset="0"/>
-                <a:cs typeface="Courier New" panose="02070309020205020404" pitchFamily="49" charset="0"/>
-              </a:rPr>
-              <a:t>}</a:t>
-            </a:r>
-          </a:p>
-          <a:p>
-            <a:pPr marL="0" indent="0">
-              <a:buNone/>
-            </a:pPr>
-            <a:r>
-              <a:rPr lang="en-US" sz="2000" dirty="0" err="1">
-                <a:solidFill>
-                  <a:schemeClr val="tx1"/>
-                </a:solidFill>
-                <a:latin typeface="Courier New" panose="02070309020205020404" pitchFamily="49" charset="0"/>
-                <a:cs typeface="Courier New" panose="02070309020205020404" pitchFamily="49" charset="0"/>
-              </a:rPr>
-              <a:t>GlobalScope.launch</a:t>
-            </a:r>
-            <a:r>
-              <a:rPr lang="en-US" sz="2000" dirty="0">
-                <a:solidFill>
-                  <a:schemeClr val="tx1"/>
-                </a:solidFill>
-                <a:latin typeface="Courier New" panose="02070309020205020404" pitchFamily="49" charset="0"/>
-                <a:cs typeface="Courier New" panose="02070309020205020404" pitchFamily="49" charset="0"/>
-              </a:rPr>
-              <a:t>(</a:t>
-            </a:r>
-            <a:r>
-              <a:rPr lang="en-US" sz="2000" dirty="0" err="1">
-                <a:solidFill>
-                  <a:schemeClr val="tx1"/>
-                </a:solidFill>
-                <a:latin typeface="Courier New" panose="02070309020205020404" pitchFamily="49" charset="0"/>
-                <a:cs typeface="Courier New" panose="02070309020205020404" pitchFamily="49" charset="0"/>
-              </a:rPr>
-              <a:t>Dispatchers.Main</a:t>
-            </a:r>
-            <a:r>
-              <a:rPr lang="en-US" sz="2000" dirty="0">
-                <a:solidFill>
-                  <a:schemeClr val="tx1"/>
-                </a:solidFill>
-                <a:latin typeface="Courier New" panose="02070309020205020404" pitchFamily="49" charset="0"/>
-                <a:cs typeface="Courier New" panose="02070309020205020404" pitchFamily="49" charset="0"/>
-              </a:rPr>
-              <a:t>).launch{</a:t>
-            </a:r>
-          </a:p>
-          <a:p>
-            <a:pPr marL="0" indent="0">
-              <a:buNone/>
-            </a:pPr>
-            <a:r>
-              <a:rPr lang="en-US" sz="2000" dirty="0">
-                <a:solidFill>
-                  <a:schemeClr val="tx1"/>
-                </a:solidFill>
-                <a:latin typeface="Courier New" panose="02070309020205020404" pitchFamily="49" charset="0"/>
-                <a:cs typeface="Courier New" panose="02070309020205020404" pitchFamily="49" charset="0"/>
-              </a:rPr>
-              <a:t>  </a:t>
-            </a:r>
-            <a:r>
-              <a:rPr lang="en-US" sz="2000" dirty="0" err="1">
-                <a:solidFill>
-                  <a:schemeClr val="tx1"/>
-                </a:solidFill>
-                <a:latin typeface="Courier New" panose="02070309020205020404" pitchFamily="49" charset="0"/>
-                <a:cs typeface="Courier New" panose="02070309020205020404" pitchFamily="49" charset="0"/>
-              </a:rPr>
-              <a:t>waitAndPrint</a:t>
-            </a:r>
-            <a:r>
-              <a:rPr lang="en-US" sz="2000" dirty="0">
-                <a:solidFill>
-                  <a:schemeClr val="tx1"/>
-                </a:solidFill>
-                <a:latin typeface="Courier New" panose="02070309020205020404" pitchFamily="49" charset="0"/>
-                <a:cs typeface="Courier New" panose="02070309020205020404" pitchFamily="49" charset="0"/>
-              </a:rPr>
-              <a:t>(1000L, "2")</a:t>
-            </a:r>
-          </a:p>
-          <a:p>
-            <a:pPr marL="0" indent="0">
-              <a:buNone/>
-            </a:pPr>
-            <a:r>
-              <a:rPr lang="en-US" sz="2000" dirty="0">
-                <a:solidFill>
-                  <a:schemeClr val="tx1"/>
-                </a:solidFill>
-                <a:latin typeface="Courier New" panose="02070309020205020404" pitchFamily="49" charset="0"/>
-                <a:cs typeface="Courier New" panose="02070309020205020404" pitchFamily="49" charset="0"/>
-              </a:rPr>
-              <a:t>}</a:t>
-            </a:r>
-          </a:p>
-          <a:p>
-            <a:pPr marL="0" indent="0">
-              <a:buNone/>
-            </a:pPr>
-            <a:r>
-              <a:rPr lang="en-US" sz="2000" dirty="0" err="1">
-                <a:solidFill>
-                  <a:schemeClr val="tx1"/>
-                </a:solidFill>
-                <a:latin typeface="Courier New" panose="02070309020205020404" pitchFamily="49" charset="0"/>
-                <a:cs typeface="Courier New" panose="02070309020205020404" pitchFamily="49" charset="0"/>
-              </a:rPr>
-              <a:t>GlobalScope.launch</a:t>
-            </a:r>
-            <a:r>
-              <a:rPr lang="en-US" sz="2000" dirty="0">
-                <a:solidFill>
-                  <a:schemeClr val="tx1"/>
-                </a:solidFill>
-                <a:latin typeface="Courier New" panose="02070309020205020404" pitchFamily="49" charset="0"/>
-                <a:cs typeface="Courier New" panose="02070309020205020404" pitchFamily="49" charset="0"/>
-              </a:rPr>
-              <a:t>(</a:t>
-            </a:r>
-            <a:r>
-              <a:rPr lang="en-US" sz="2000" dirty="0" err="1">
-                <a:solidFill>
-                  <a:schemeClr val="tx1"/>
-                </a:solidFill>
-                <a:latin typeface="Courier New" panose="02070309020205020404" pitchFamily="49" charset="0"/>
-                <a:cs typeface="Courier New" panose="02070309020205020404" pitchFamily="49" charset="0"/>
-              </a:rPr>
-              <a:t>Dispatchers.Main</a:t>
-            </a:r>
-            <a:r>
-              <a:rPr lang="en-US" sz="2000" dirty="0">
-                <a:solidFill>
-                  <a:schemeClr val="tx1"/>
-                </a:solidFill>
-                <a:latin typeface="Courier New" panose="02070309020205020404" pitchFamily="49" charset="0"/>
-                <a:cs typeface="Courier New" panose="02070309020205020404" pitchFamily="49" charset="0"/>
-              </a:rPr>
-              <a:t>).launch{</a:t>
-            </a:r>
-          </a:p>
-          <a:p>
-            <a:pPr marL="0" indent="0">
-              <a:buNone/>
-            </a:pPr>
-            <a:r>
-              <a:rPr lang="en-US" sz="2000" dirty="0">
-                <a:solidFill>
-                  <a:schemeClr val="tx1"/>
-                </a:solidFill>
-                <a:latin typeface="Courier New" panose="02070309020205020404" pitchFamily="49" charset="0"/>
-                <a:cs typeface="Courier New" panose="02070309020205020404" pitchFamily="49" charset="0"/>
-              </a:rPr>
-              <a:t>  </a:t>
-            </a:r>
-            <a:r>
-              <a:rPr lang="en-US" sz="2000" dirty="0" err="1">
-                <a:solidFill>
-                  <a:schemeClr val="tx1"/>
-                </a:solidFill>
-                <a:latin typeface="Courier New" panose="02070309020205020404" pitchFamily="49" charset="0"/>
-                <a:cs typeface="Courier New" panose="02070309020205020404" pitchFamily="49" charset="0"/>
-              </a:rPr>
-              <a:t>println</a:t>
-            </a:r>
-            <a:r>
-              <a:rPr lang="en-US" sz="2000" dirty="0">
-                <a:solidFill>
-                  <a:schemeClr val="tx1"/>
-                </a:solidFill>
-                <a:latin typeface="Courier New" panose="02070309020205020404" pitchFamily="49" charset="0"/>
-                <a:cs typeface="Courier New" panose="02070309020205020404" pitchFamily="49" charset="0"/>
-              </a:rPr>
-              <a:t>("1")</a:t>
-            </a:r>
-          </a:p>
-          <a:p>
-            <a:pPr marL="0" indent="0">
-              <a:buNone/>
-            </a:pPr>
-            <a:r>
-              <a:rPr lang="en-US" sz="2000" dirty="0">
-                <a:solidFill>
-                  <a:schemeClr val="tx1"/>
-                </a:solidFill>
-                <a:latin typeface="Courier New" panose="02070309020205020404" pitchFamily="49" charset="0"/>
-                <a:cs typeface="Courier New" panose="02070309020205020404" pitchFamily="49" charset="0"/>
-              </a:rPr>
-              <a:t>}</a:t>
-            </a:r>
-          </a:p>
-        </p:txBody>
-      </p:sp>
-    </p:spTree>
-    <p:extLst>
-      <p:ext uri="{BB962C8B-B14F-4D97-AF65-F5344CB8AC3E}">
-        <p14:creationId xmlns:p14="http://schemas.microsoft.com/office/powerpoint/2010/main" val="1297195261"/>
       </p:ext>
     </p:extLst>
   </p:cSld>
@@ -11934,15 +10597,33 @@
                                   </p:childTnLst>
                                 </p:cTn>
                               </p:par>
+                            </p:childTnLst>
+                          </p:cTn>
+                        </p:par>
+                      </p:childTnLst>
+                    </p:cTn>
+                  </p:par>
+                  <p:par>
+                    <p:cTn id="27" fill="hold">
+                      <p:stCondLst>
+                        <p:cond delay="indefinite"/>
+                      </p:stCondLst>
+                      <p:childTnLst>
+                        <p:par>
+                          <p:cTn id="28" fill="hold">
+                            <p:stCondLst>
+                              <p:cond delay="0"/>
+                            </p:stCondLst>
+                            <p:childTnLst>
                               <p:par>
-                                <p:cTn id="27" presetID="1" presetClass="entr" presetSubtype="0" fill="hold" nodeType="withEffect">
+                                <p:cTn id="29" presetID="1" presetClass="entr" presetSubtype="0" fill="hold" nodeType="clickEffect">
                                   <p:stCondLst>
                                     <p:cond delay="0"/>
                                   </p:stCondLst>
                                   <p:childTnLst>
                                     <p:set>
                                       <p:cBhvr>
-                                        <p:cTn id="28" dur="1" fill="hold">
+                                        <p:cTn id="30" dur="1" fill="hold">
                                           <p:stCondLst>
                                             <p:cond delay="0"/>
                                           </p:stCondLst>
@@ -11950,7 +10631,7 @@
                                         <p:tgtEl>
                                           <p:spTgt spid="6">
                                             <p:txEl>
-                                              <p:pRg st="9" end="9"/>
+                                              <p:pRg st="1" end="1"/>
                                             </p:txEl>
                                           </p:spTgt>
                                         </p:tgtEl>
@@ -11972,26 +10653,26 @@
                     </p:cTn>
                   </p:par>
                   <p:par>
-                    <p:cTn id="29" fill="hold">
+                    <p:cTn id="31" fill="hold">
                       <p:stCondLst>
                         <p:cond delay="indefinite"/>
                       </p:stCondLst>
                       <p:childTnLst>
                         <p:par>
-                          <p:cTn id="30" fill="hold">
+                          <p:cTn id="32" fill="hold">
                             <p:stCondLst>
                               <p:cond delay="0"/>
                             </p:stCondLst>
                             <p:childTnLst>
                               <p:par>
-                                <p:cTn id="31" presetID="1" presetClass="entr" presetSubtype="0" fill="hold" nodeType="clickEffect">
+                                <p:cTn id="33" presetID="1" presetClass="entr" presetSubtype="0" fill="hold" nodeType="clickEffect">
                                   <p:stCondLst>
                                     <p:cond delay="0"/>
                                   </p:stCondLst>
                                   <p:childTnLst>
                                     <p:set>
                                       <p:cBhvr>
-                                        <p:cTn id="32" dur="1" fill="hold">
+                                        <p:cTn id="34" dur="1" fill="hold">
                                           <p:stCondLst>
                                             <p:cond delay="0"/>
                                           </p:stCondLst>
@@ -12021,19 +10702,1486 @@
                     </p:cTn>
                   </p:par>
                   <p:par>
-                    <p:cTn id="33" fill="hold">
+                    <p:cTn id="35" fill="hold">
                       <p:stCondLst>
                         <p:cond delay="indefinite"/>
                       </p:stCondLst>
                       <p:childTnLst>
                         <p:par>
-                          <p:cTn id="34" fill="hold">
+                          <p:cTn id="36" fill="hold">
                             <p:stCondLst>
                               <p:cond delay="0"/>
                             </p:stCondLst>
                             <p:childTnLst>
                               <p:par>
-                                <p:cTn id="35" presetID="1" presetClass="entr" presetSubtype="0" fill="hold" nodeType="clickEffect">
+                                <p:cTn id="37" presetID="1" presetClass="entr" presetSubtype="0" fill="hold" nodeType="clickEffect">
+                                  <p:stCondLst>
+                                    <p:cond delay="0"/>
+                                  </p:stCondLst>
+                                  <p:childTnLst>
+                                    <p:set>
+                                      <p:cBhvr>
+                                        <p:cTn id="38" dur="1" fill="hold">
+                                          <p:stCondLst>
+                                            <p:cond delay="0"/>
+                                          </p:stCondLst>
+                                        </p:cTn>
+                                        <p:tgtEl>
+                                          <p:spTgt spid="6">
+                                            <p:txEl>
+                                              <p:pRg st="2" end="2"/>
+                                            </p:txEl>
+                                          </p:spTgt>
+                                        </p:tgtEl>
+                                        <p:attrNameLst>
+                                          <p:attrName>style.visibility</p:attrName>
+                                        </p:attrNameLst>
+                                      </p:cBhvr>
+                                      <p:to>
+                                        <p:strVal val="visible"/>
+                                      </p:to>
+                                    </p:set>
+                                  </p:childTnLst>
+                                </p:cTn>
+                              </p:par>
+                            </p:childTnLst>
+                          </p:cTn>
+                        </p:par>
+                      </p:childTnLst>
+                    </p:cTn>
+                  </p:par>
+                  <p:par>
+                    <p:cTn id="39" fill="hold">
+                      <p:stCondLst>
+                        <p:cond delay="indefinite"/>
+                      </p:stCondLst>
+                      <p:childTnLst>
+                        <p:par>
+                          <p:cTn id="40" fill="hold">
+                            <p:stCondLst>
+                              <p:cond delay="0"/>
+                            </p:stCondLst>
+                            <p:childTnLst>
+                              <p:par>
+                                <p:cTn id="41" presetID="1" presetClass="entr" presetSubtype="0" fill="hold" grpId="0" nodeType="clickEffect">
+                                  <p:stCondLst>
+                                    <p:cond delay="0"/>
+                                  </p:stCondLst>
+                                  <p:childTnLst>
+                                    <p:set>
+                                      <p:cBhvr>
+                                        <p:cTn id="42" dur="1" fill="hold">
+                                          <p:stCondLst>
+                                            <p:cond delay="0"/>
+                                          </p:stCondLst>
+                                        </p:cTn>
+                                        <p:tgtEl>
+                                          <p:spTgt spid="7">
+                                            <p:bg/>
+                                          </p:spTgt>
+                                        </p:tgtEl>
+                                        <p:attrNameLst>
+                                          <p:attrName>style.visibility</p:attrName>
+                                        </p:attrNameLst>
+                                      </p:cBhvr>
+                                      <p:to>
+                                        <p:strVal val="visible"/>
+                                      </p:to>
+                                    </p:set>
+                                  </p:childTnLst>
+                                </p:cTn>
+                              </p:par>
+                            </p:childTnLst>
+                          </p:cTn>
+                        </p:par>
+                      </p:childTnLst>
+                    </p:cTn>
+                  </p:par>
+                  <p:par>
+                    <p:cTn id="43" fill="hold">
+                      <p:stCondLst>
+                        <p:cond delay="indefinite"/>
+                      </p:stCondLst>
+                      <p:childTnLst>
+                        <p:par>
+                          <p:cTn id="44" fill="hold">
+                            <p:stCondLst>
+                              <p:cond delay="0"/>
+                            </p:stCondLst>
+                            <p:childTnLst>
+                              <p:par>
+                                <p:cTn id="45" presetID="1" presetClass="entr" presetSubtype="0" fill="hold" nodeType="clickEffect">
+                                  <p:stCondLst>
+                                    <p:cond delay="0"/>
+                                  </p:stCondLst>
+                                  <p:childTnLst>
+                                    <p:set>
+                                      <p:cBhvr>
+                                        <p:cTn id="46" dur="1" fill="hold">
+                                          <p:stCondLst>
+                                            <p:cond delay="0"/>
+                                          </p:stCondLst>
+                                        </p:cTn>
+                                        <p:tgtEl>
+                                          <p:spTgt spid="7">
+                                            <p:txEl>
+                                              <p:pRg st="0" end="0"/>
+                                            </p:txEl>
+                                          </p:spTgt>
+                                        </p:tgtEl>
+                                        <p:attrNameLst>
+                                          <p:attrName>style.visibility</p:attrName>
+                                        </p:attrNameLst>
+                                      </p:cBhvr>
+                                      <p:to>
+                                        <p:strVal val="visible"/>
+                                      </p:to>
+                                    </p:set>
+                                  </p:childTnLst>
+                                </p:cTn>
+                              </p:par>
+                              <p:par>
+                                <p:cTn id="47" presetID="1" presetClass="entr" presetSubtype="0" fill="hold" nodeType="withEffect">
+                                  <p:stCondLst>
+                                    <p:cond delay="0"/>
+                                  </p:stCondLst>
+                                  <p:childTnLst>
+                                    <p:set>
+                                      <p:cBhvr>
+                                        <p:cTn id="48" dur="1" fill="hold">
+                                          <p:stCondLst>
+                                            <p:cond delay="0"/>
+                                          </p:stCondLst>
+                                        </p:cTn>
+                                        <p:tgtEl>
+                                          <p:spTgt spid="7">
+                                            <p:txEl>
+                                              <p:pRg st="3" end="3"/>
+                                            </p:txEl>
+                                          </p:spTgt>
+                                        </p:tgtEl>
+                                        <p:attrNameLst>
+                                          <p:attrName>style.visibility</p:attrName>
+                                        </p:attrNameLst>
+                                      </p:cBhvr>
+                                      <p:to>
+                                        <p:strVal val="visible"/>
+                                      </p:to>
+                                    </p:set>
+                                  </p:childTnLst>
+                                </p:cTn>
+                              </p:par>
+                            </p:childTnLst>
+                          </p:cTn>
+                        </p:par>
+                      </p:childTnLst>
+                    </p:cTn>
+                  </p:par>
+                  <p:par>
+                    <p:cTn id="49" fill="hold">
+                      <p:stCondLst>
+                        <p:cond delay="indefinite"/>
+                      </p:stCondLst>
+                      <p:childTnLst>
+                        <p:par>
+                          <p:cTn id="50" fill="hold">
+                            <p:stCondLst>
+                              <p:cond delay="0"/>
+                            </p:stCondLst>
+                            <p:childTnLst>
+                              <p:par>
+                                <p:cTn id="51" presetID="1" presetClass="entr" presetSubtype="0" fill="hold" nodeType="clickEffect">
+                                  <p:stCondLst>
+                                    <p:cond delay="0"/>
+                                  </p:stCondLst>
+                                  <p:childTnLst>
+                                    <p:set>
+                                      <p:cBhvr>
+                                        <p:cTn id="52" dur="1" fill="hold">
+                                          <p:stCondLst>
+                                            <p:cond delay="0"/>
+                                          </p:stCondLst>
+                                        </p:cTn>
+                                        <p:tgtEl>
+                                          <p:spTgt spid="7">
+                                            <p:txEl>
+                                              <p:pRg st="4" end="4"/>
+                                            </p:txEl>
+                                          </p:spTgt>
+                                        </p:tgtEl>
+                                        <p:attrNameLst>
+                                          <p:attrName>style.visibility</p:attrName>
+                                        </p:attrNameLst>
+                                      </p:cBhvr>
+                                      <p:to>
+                                        <p:strVal val="visible"/>
+                                      </p:to>
+                                    </p:set>
+                                  </p:childTnLst>
+                                </p:cTn>
+                              </p:par>
+                              <p:par>
+                                <p:cTn id="53" presetID="1" presetClass="entr" presetSubtype="0" fill="hold" nodeType="withEffect">
+                                  <p:stCondLst>
+                                    <p:cond delay="0"/>
+                                  </p:stCondLst>
+                                  <p:childTnLst>
+                                    <p:set>
+                                      <p:cBhvr>
+                                        <p:cTn id="54" dur="1" fill="hold">
+                                          <p:stCondLst>
+                                            <p:cond delay="0"/>
+                                          </p:stCondLst>
+                                        </p:cTn>
+                                        <p:tgtEl>
+                                          <p:spTgt spid="7">
+                                            <p:txEl>
+                                              <p:pRg st="6" end="6"/>
+                                            </p:txEl>
+                                          </p:spTgt>
+                                        </p:tgtEl>
+                                        <p:attrNameLst>
+                                          <p:attrName>style.visibility</p:attrName>
+                                        </p:attrNameLst>
+                                      </p:cBhvr>
+                                      <p:to>
+                                        <p:strVal val="visible"/>
+                                      </p:to>
+                                    </p:set>
+                                  </p:childTnLst>
+                                </p:cTn>
+                              </p:par>
+                            </p:childTnLst>
+                          </p:cTn>
+                        </p:par>
+                      </p:childTnLst>
+                    </p:cTn>
+                  </p:par>
+                  <p:par>
+                    <p:cTn id="55" fill="hold">
+                      <p:stCondLst>
+                        <p:cond delay="indefinite"/>
+                      </p:stCondLst>
+                      <p:childTnLst>
+                        <p:par>
+                          <p:cTn id="56" fill="hold">
+                            <p:stCondLst>
+                              <p:cond delay="0"/>
+                            </p:stCondLst>
+                            <p:childTnLst>
+                              <p:par>
+                                <p:cTn id="57" presetID="1" presetClass="entr" presetSubtype="0" fill="hold" nodeType="clickEffect">
+                                  <p:stCondLst>
+                                    <p:cond delay="0"/>
+                                  </p:stCondLst>
+                                  <p:childTnLst>
+                                    <p:set>
+                                      <p:cBhvr>
+                                        <p:cTn id="58" dur="1" fill="hold">
+                                          <p:stCondLst>
+                                            <p:cond delay="0"/>
+                                          </p:stCondLst>
+                                        </p:cTn>
+                                        <p:tgtEl>
+                                          <p:spTgt spid="7">
+                                            <p:txEl>
+                                              <p:pRg st="7" end="7"/>
+                                            </p:txEl>
+                                          </p:spTgt>
+                                        </p:tgtEl>
+                                        <p:attrNameLst>
+                                          <p:attrName>style.visibility</p:attrName>
+                                        </p:attrNameLst>
+                                      </p:cBhvr>
+                                      <p:to>
+                                        <p:strVal val="visible"/>
+                                      </p:to>
+                                    </p:set>
+                                  </p:childTnLst>
+                                </p:cTn>
+                              </p:par>
+                            </p:childTnLst>
+                          </p:cTn>
+                        </p:par>
+                      </p:childTnLst>
+                    </p:cTn>
+                  </p:par>
+                  <p:par>
+                    <p:cTn id="59" fill="hold">
+                      <p:stCondLst>
+                        <p:cond delay="indefinite"/>
+                      </p:stCondLst>
+                      <p:childTnLst>
+                        <p:par>
+                          <p:cTn id="60" fill="hold">
+                            <p:stCondLst>
+                              <p:cond delay="0"/>
+                            </p:stCondLst>
+                            <p:childTnLst>
+                              <p:par>
+                                <p:cTn id="61" presetID="1" presetClass="entr" presetSubtype="0" fill="hold" nodeType="clickEffect">
+                                  <p:stCondLst>
+                                    <p:cond delay="0"/>
+                                  </p:stCondLst>
+                                  <p:childTnLst>
+                                    <p:set>
+                                      <p:cBhvr>
+                                        <p:cTn id="62" dur="1" fill="hold">
+                                          <p:stCondLst>
+                                            <p:cond delay="0"/>
+                                          </p:stCondLst>
+                                        </p:cTn>
+                                        <p:tgtEl>
+                                          <p:spTgt spid="7">
+                                            <p:txEl>
+                                              <p:pRg st="1" end="1"/>
+                                            </p:txEl>
+                                          </p:spTgt>
+                                        </p:tgtEl>
+                                        <p:attrNameLst>
+                                          <p:attrName>style.visibility</p:attrName>
+                                        </p:attrNameLst>
+                                      </p:cBhvr>
+                                      <p:to>
+                                        <p:strVal val="visible"/>
+                                      </p:to>
+                                    </p:set>
+                                  </p:childTnLst>
+                                </p:cTn>
+                              </p:par>
+                            </p:childTnLst>
+                          </p:cTn>
+                        </p:par>
+                      </p:childTnLst>
+                    </p:cTn>
+                  </p:par>
+                  <p:par>
+                    <p:cTn id="63" fill="hold">
+                      <p:stCondLst>
+                        <p:cond delay="indefinite"/>
+                      </p:stCondLst>
+                      <p:childTnLst>
+                        <p:par>
+                          <p:cTn id="64" fill="hold">
+                            <p:stCondLst>
+                              <p:cond delay="0"/>
+                            </p:stCondLst>
+                            <p:childTnLst>
+                              <p:par>
+                                <p:cTn id="65" presetID="1" presetClass="entr" presetSubtype="0" fill="hold" nodeType="clickEffect">
+                                  <p:stCondLst>
+                                    <p:cond delay="0"/>
+                                  </p:stCondLst>
+                                  <p:childTnLst>
+                                    <p:set>
+                                      <p:cBhvr>
+                                        <p:cTn id="66" dur="1" fill="hold">
+                                          <p:stCondLst>
+                                            <p:cond delay="0"/>
+                                          </p:stCondLst>
+                                        </p:cTn>
+                                        <p:tgtEl>
+                                          <p:spTgt spid="7">
+                                            <p:txEl>
+                                              <p:pRg st="2" end="2"/>
+                                            </p:txEl>
+                                          </p:spTgt>
+                                        </p:tgtEl>
+                                        <p:attrNameLst>
+                                          <p:attrName>style.visibility</p:attrName>
+                                        </p:attrNameLst>
+                                      </p:cBhvr>
+                                      <p:to>
+                                        <p:strVal val="visible"/>
+                                      </p:to>
+                                    </p:set>
+                                  </p:childTnLst>
+                                </p:cTn>
+                              </p:par>
+                            </p:childTnLst>
+                          </p:cTn>
+                        </p:par>
+                      </p:childTnLst>
+                    </p:cTn>
+                  </p:par>
+                  <p:par>
+                    <p:cTn id="67" fill="hold">
+                      <p:stCondLst>
+                        <p:cond delay="indefinite"/>
+                      </p:stCondLst>
+                      <p:childTnLst>
+                        <p:par>
+                          <p:cTn id="68" fill="hold">
+                            <p:stCondLst>
+                              <p:cond delay="0"/>
+                            </p:stCondLst>
+                            <p:childTnLst>
+                              <p:par>
+                                <p:cTn id="69" presetID="1" presetClass="entr" presetSubtype="0" fill="hold" nodeType="clickEffect">
+                                  <p:stCondLst>
+                                    <p:cond delay="0"/>
+                                  </p:stCondLst>
+                                  <p:childTnLst>
+                                    <p:set>
+                                      <p:cBhvr>
+                                        <p:cTn id="70" dur="1" fill="hold">
+                                          <p:stCondLst>
+                                            <p:cond delay="0"/>
+                                          </p:stCondLst>
+                                        </p:cTn>
+                                        <p:tgtEl>
+                                          <p:spTgt spid="7">
+                                            <p:txEl>
+                                              <p:pRg st="5" end="5"/>
+                                            </p:txEl>
+                                          </p:spTgt>
+                                        </p:tgtEl>
+                                        <p:attrNameLst>
+                                          <p:attrName>style.visibility</p:attrName>
+                                        </p:attrNameLst>
+                                      </p:cBhvr>
+                                      <p:to>
+                                        <p:strVal val="visible"/>
+                                      </p:to>
+                                    </p:set>
+                                  </p:childTnLst>
+                                </p:cTn>
+                              </p:par>
+                            </p:childTnLst>
+                          </p:cTn>
+                        </p:par>
+                      </p:childTnLst>
+                    </p:cTn>
+                  </p:par>
+                </p:childTnLst>
+              </p:cTn>
+              <p:prevCondLst>
+                <p:cond evt="onPrev" delay="0">
+                  <p:tgtEl>
+                    <p:sldTgt/>
+                  </p:tgtEl>
+                </p:cond>
+              </p:prevCondLst>
+              <p:nextCondLst>
+                <p:cond evt="onNext" delay="0">
+                  <p:tgtEl>
+                    <p:sldTgt/>
+                  </p:tgtEl>
+                </p:cond>
+              </p:nextCondLst>
+            </p:seq>
+          </p:childTnLst>
+        </p:cTn>
+      </p:par>
+    </p:tnLst>
+    <p:bldLst>
+      <p:bldP spid="5" grpId="0" build="p"/>
+      <p:bldP spid="6" grpId="0" build="p" animBg="1"/>
+      <p:bldP spid="7" grpId="0" build="p" animBg="1"/>
+    </p:bldLst>
+  </p:timing>
+</p:sld>
+</file>
+
+<file path=ppt/slides/slide12.xml><?xml version="1.0" encoding="utf-8"?>
+<p:sld xmlns:a="http://schemas.openxmlformats.org/drawingml/2006/main" xmlns:r="http://schemas.openxmlformats.org/officeDocument/2006/relationships" xmlns:p="http://schemas.openxmlformats.org/presentationml/2006/main">
+  <p:cSld>
+    <p:spTree>
+      <p:nvGrpSpPr>
+        <p:cNvPr id="1" name=""/>
+        <p:cNvGrpSpPr/>
+        <p:nvPr/>
+      </p:nvGrpSpPr>
+      <p:grpSpPr>
+        <a:xfrm>
+          <a:off x="0" y="0"/>
+          <a:ext cx="0" cy="0"/>
+          <a:chOff x="0" y="0"/>
+          <a:chExt cx="0" cy="0"/>
+        </a:xfrm>
+      </p:grpSpPr>
+      <p:sp>
+        <p:nvSpPr>
+          <p:cNvPr id="2" name="Title 1"/>
+          <p:cNvSpPr>
+            <a:spLocks noGrp="1"/>
+          </p:cNvSpPr>
+          <p:nvPr>
+            <p:ph type="title"/>
+          </p:nvPr>
+        </p:nvSpPr>
+        <p:spPr/>
+        <p:txBody>
+          <a:bodyPr/>
+          <a:lstStyle/>
+          <a:p>
+            <a:r>
+              <a:rPr lang="en-US" dirty="0"/>
+              <a:t>Suspending functions</a:t>
+            </a:r>
+          </a:p>
+        </p:txBody>
+      </p:sp>
+      <p:sp>
+        <p:nvSpPr>
+          <p:cNvPr id="5" name="Content Placeholder 2">
+            <a:extLst>
+              <a:ext uri="{FF2B5EF4-FFF2-40B4-BE49-F238E27FC236}">
+                <a16:creationId xmlns:a16="http://schemas.microsoft.com/office/drawing/2014/main" id="{9AF0E311-5F72-4E3F-A2F9-8F31E389888B}"/>
+              </a:ext>
+            </a:extLst>
+          </p:cNvPr>
+          <p:cNvSpPr>
+            <a:spLocks noGrp="1"/>
+          </p:cNvSpPr>
+          <p:nvPr>
+            <p:ph idx="1"/>
+          </p:nvPr>
+        </p:nvSpPr>
+        <p:spPr>
+          <a:xfrm>
+            <a:off x="838200" y="1825625"/>
+            <a:ext cx="11080898" cy="867930"/>
+          </a:xfrm>
+        </p:spPr>
+        <p:txBody>
+          <a:bodyPr wrap="square">
+            <a:spAutoFit/>
+          </a:bodyPr>
+          <a:lstStyle/>
+          <a:p>
+            <a:pPr marL="0" indent="0">
+              <a:buNone/>
+            </a:pPr>
+            <a:r>
+              <a:rPr lang="en-US" dirty="0"/>
+              <a:t>Suspend functions can only be used in coroutines and other suspend functions.</a:t>
+            </a:r>
+            <a:endParaRPr lang="en-US" dirty="0">
+              <a:latin typeface="+mn-lt"/>
+            </a:endParaRPr>
+          </a:p>
+        </p:txBody>
+      </p:sp>
+      <p:sp>
+        <p:nvSpPr>
+          <p:cNvPr id="6" name="Content Placeholder 3">
+            <a:extLst>
+              <a:ext uri="{FF2B5EF4-FFF2-40B4-BE49-F238E27FC236}">
+                <a16:creationId xmlns:a16="http://schemas.microsoft.com/office/drawing/2014/main" id="{4C78578D-DD09-466E-9732-2AA6C90B2D71}"/>
+              </a:ext>
+            </a:extLst>
+          </p:cNvPr>
+          <p:cNvSpPr txBox="1">
+            <a:spLocks/>
+          </p:cNvSpPr>
+          <p:nvPr/>
+        </p:nvSpPr>
+        <p:spPr>
+          <a:xfrm>
+            <a:off x="1056167" y="2693555"/>
+            <a:ext cx="10644963" cy="4024179"/>
+          </a:xfrm>
+          <a:prstGeom prst="rect">
+            <a:avLst/>
+          </a:prstGeom>
+          <a:solidFill>
+            <a:schemeClr val="bg1">
+              <a:lumMod val="95000"/>
+            </a:schemeClr>
+          </a:solidFill>
+          <a:effectLst>
+            <a:glow rad="139700">
+              <a:schemeClr val="bg1">
+                <a:lumMod val="95000"/>
+              </a:schemeClr>
+            </a:glow>
+          </a:effectLst>
+        </p:spPr>
+        <p:txBody>
+          <a:bodyPr vert="horz" wrap="square" lIns="91440" tIns="45720" rIns="91440" bIns="45720" rtlCol="0">
+            <a:spAutoFit/>
+          </a:bodyPr>
+          <a:lstStyle>
+            <a:lvl1pPr marL="228600" indent="-228600" algn="l" defTabSz="914400" rtl="0" eaLnBrk="1" latinLnBrk="0" hangingPunct="1">
+              <a:lnSpc>
+                <a:spcPct val="90000"/>
+              </a:lnSpc>
+              <a:spcBef>
+                <a:spcPts val="1000"/>
+              </a:spcBef>
+              <a:buFont typeface="Arial" panose="020B0604020202020204" pitchFamily="34" charset="0"/>
+              <a:buChar char="•"/>
+              <a:defRPr sz="2800" kern="1200">
+                <a:solidFill>
+                  <a:schemeClr val="bg1"/>
+                </a:solidFill>
+                <a:latin typeface="BentonSans Medium" panose="02000603000000020004" pitchFamily="50" charset="0"/>
+                <a:ea typeface="+mn-ea"/>
+                <a:cs typeface="+mn-cs"/>
+              </a:defRPr>
+            </a:lvl1pPr>
+            <a:lvl2pPr marL="685800" indent="-228600" algn="l" defTabSz="914400" rtl="0" eaLnBrk="1" latinLnBrk="0" hangingPunct="1">
+              <a:lnSpc>
+                <a:spcPct val="90000"/>
+              </a:lnSpc>
+              <a:spcBef>
+                <a:spcPts val="500"/>
+              </a:spcBef>
+              <a:buFont typeface="Arial" panose="020B0604020202020204" pitchFamily="34" charset="0"/>
+              <a:buChar char="•"/>
+              <a:defRPr sz="2400" kern="1200">
+                <a:solidFill>
+                  <a:schemeClr val="bg1"/>
+                </a:solidFill>
+                <a:latin typeface="BentonSans Regular" panose="02000503000000020004" pitchFamily="50" charset="0"/>
+                <a:ea typeface="+mn-ea"/>
+                <a:cs typeface="+mn-cs"/>
+              </a:defRPr>
+            </a:lvl2pPr>
+            <a:lvl3pPr marL="1143000" indent="-228600" algn="l" defTabSz="914400" rtl="0" eaLnBrk="1" latinLnBrk="0" hangingPunct="1">
+              <a:lnSpc>
+                <a:spcPct val="90000"/>
+              </a:lnSpc>
+              <a:spcBef>
+                <a:spcPts val="500"/>
+              </a:spcBef>
+              <a:buFont typeface="Arial" panose="020B0604020202020204" pitchFamily="34" charset="0"/>
+              <a:buChar char="•"/>
+              <a:defRPr sz="2000" kern="1200">
+                <a:solidFill>
+                  <a:schemeClr val="bg1"/>
+                </a:solidFill>
+                <a:latin typeface="BentonSans Regular" panose="02000503000000020004" pitchFamily="50" charset="0"/>
+                <a:ea typeface="+mn-ea"/>
+                <a:cs typeface="+mn-cs"/>
+              </a:defRPr>
+            </a:lvl3pPr>
+            <a:lvl4pPr marL="1600200" indent="-228600" algn="l" defTabSz="914400" rtl="0" eaLnBrk="1" latinLnBrk="0" hangingPunct="1">
+              <a:lnSpc>
+                <a:spcPct val="90000"/>
+              </a:lnSpc>
+              <a:spcBef>
+                <a:spcPts val="500"/>
+              </a:spcBef>
+              <a:buFont typeface="Arial" panose="020B0604020202020204" pitchFamily="34" charset="0"/>
+              <a:buChar char="•"/>
+              <a:defRPr sz="1800" kern="1200">
+                <a:solidFill>
+                  <a:schemeClr val="bg1"/>
+                </a:solidFill>
+                <a:latin typeface="BentonSans Regular" panose="02000503000000020004" pitchFamily="50" charset="0"/>
+                <a:ea typeface="+mn-ea"/>
+                <a:cs typeface="+mn-cs"/>
+              </a:defRPr>
+            </a:lvl4pPr>
+            <a:lvl5pPr marL="2057400" indent="-228600" algn="l" defTabSz="914400" rtl="0" eaLnBrk="1" latinLnBrk="0" hangingPunct="1">
+              <a:lnSpc>
+                <a:spcPct val="90000"/>
+              </a:lnSpc>
+              <a:spcBef>
+                <a:spcPts val="500"/>
+              </a:spcBef>
+              <a:buFont typeface="Arial" panose="020B0604020202020204" pitchFamily="34" charset="0"/>
+              <a:buChar char="•"/>
+              <a:defRPr sz="1800" kern="1200">
+                <a:solidFill>
+                  <a:schemeClr val="bg1"/>
+                </a:solidFill>
+                <a:latin typeface="BentonSans Regular" panose="02000503000000020004" pitchFamily="50" charset="0"/>
+                <a:ea typeface="+mn-ea"/>
+                <a:cs typeface="+mn-cs"/>
+              </a:defRPr>
+            </a:lvl5pPr>
+            <a:lvl6pPr marL="2514600" indent="-228600" algn="l" defTabSz="914400" rtl="0" eaLnBrk="1" latinLnBrk="0" hangingPunct="1">
+              <a:lnSpc>
+                <a:spcPct val="90000"/>
+              </a:lnSpc>
+              <a:spcBef>
+                <a:spcPts val="500"/>
+              </a:spcBef>
+              <a:buFont typeface="Arial" panose="020B0604020202020204" pitchFamily="34" charset="0"/>
+              <a:buChar char="•"/>
+              <a:defRPr sz="1800" kern="1200">
+                <a:solidFill>
+                  <a:schemeClr val="tx1"/>
+                </a:solidFill>
+                <a:latin typeface="+mn-lt"/>
+                <a:ea typeface="+mn-ea"/>
+                <a:cs typeface="+mn-cs"/>
+              </a:defRPr>
+            </a:lvl6pPr>
+            <a:lvl7pPr marL="2971800" indent="-228600" algn="l" defTabSz="914400" rtl="0" eaLnBrk="1" latinLnBrk="0" hangingPunct="1">
+              <a:lnSpc>
+                <a:spcPct val="90000"/>
+              </a:lnSpc>
+              <a:spcBef>
+                <a:spcPts val="500"/>
+              </a:spcBef>
+              <a:buFont typeface="Arial" panose="020B0604020202020204" pitchFamily="34" charset="0"/>
+              <a:buChar char="•"/>
+              <a:defRPr sz="1800" kern="1200">
+                <a:solidFill>
+                  <a:schemeClr val="tx1"/>
+                </a:solidFill>
+                <a:latin typeface="+mn-lt"/>
+                <a:ea typeface="+mn-ea"/>
+                <a:cs typeface="+mn-cs"/>
+              </a:defRPr>
+            </a:lvl7pPr>
+            <a:lvl8pPr marL="3429000" indent="-228600" algn="l" defTabSz="914400" rtl="0" eaLnBrk="1" latinLnBrk="0" hangingPunct="1">
+              <a:lnSpc>
+                <a:spcPct val="90000"/>
+              </a:lnSpc>
+              <a:spcBef>
+                <a:spcPts val="500"/>
+              </a:spcBef>
+              <a:buFont typeface="Arial" panose="020B0604020202020204" pitchFamily="34" charset="0"/>
+              <a:buChar char="•"/>
+              <a:defRPr sz="1800" kern="1200">
+                <a:solidFill>
+                  <a:schemeClr val="tx1"/>
+                </a:solidFill>
+                <a:latin typeface="+mn-lt"/>
+                <a:ea typeface="+mn-ea"/>
+                <a:cs typeface="+mn-cs"/>
+              </a:defRPr>
+            </a:lvl8pPr>
+            <a:lvl9pPr marL="3886200" indent="-228600" algn="l" defTabSz="914400" rtl="0" eaLnBrk="1" latinLnBrk="0" hangingPunct="1">
+              <a:lnSpc>
+                <a:spcPct val="90000"/>
+              </a:lnSpc>
+              <a:spcBef>
+                <a:spcPts val="500"/>
+              </a:spcBef>
+              <a:buFont typeface="Arial" panose="020B0604020202020204" pitchFamily="34" charset="0"/>
+              <a:buChar char="•"/>
+              <a:defRPr sz="1800" kern="1200">
+                <a:solidFill>
+                  <a:schemeClr val="tx1"/>
+                </a:solidFill>
+                <a:latin typeface="+mn-lt"/>
+                <a:ea typeface="+mn-ea"/>
+                <a:cs typeface="+mn-cs"/>
+              </a:defRPr>
+            </a:lvl9pPr>
+          </a:lstStyle>
+          <a:p>
+            <a:pPr marL="0" indent="0">
+              <a:buNone/>
+            </a:pPr>
+            <a:r>
+              <a:rPr lang="en-US" sz="2000" b="1" dirty="0">
+                <a:solidFill>
+                  <a:schemeClr val="tx2"/>
+                </a:solidFill>
+                <a:latin typeface="Courier New" panose="02070309020205020404" pitchFamily="49" charset="0"/>
+                <a:cs typeface="Courier New" panose="02070309020205020404" pitchFamily="49" charset="0"/>
+              </a:rPr>
+              <a:t>suspend fun </a:t>
+            </a:r>
+            <a:r>
+              <a:rPr lang="en-US" sz="2000" dirty="0" err="1">
+                <a:solidFill>
+                  <a:schemeClr val="tx1"/>
+                </a:solidFill>
+                <a:latin typeface="Courier New" panose="02070309020205020404" pitchFamily="49" charset="0"/>
+                <a:cs typeface="Courier New" panose="02070309020205020404" pitchFamily="49" charset="0"/>
+              </a:rPr>
+              <a:t>waitAndPrint</a:t>
+            </a:r>
+            <a:r>
+              <a:rPr lang="en-US" sz="2000" dirty="0">
+                <a:solidFill>
+                  <a:schemeClr val="tx1"/>
+                </a:solidFill>
+                <a:latin typeface="Courier New" panose="02070309020205020404" pitchFamily="49" charset="0"/>
+                <a:cs typeface="Courier New" panose="02070309020205020404" pitchFamily="49" charset="0"/>
+              </a:rPr>
+              <a:t>(time: Long, message: String){</a:t>
+            </a:r>
+          </a:p>
+          <a:p>
+            <a:pPr marL="0" indent="0">
+              <a:buNone/>
+            </a:pPr>
+            <a:r>
+              <a:rPr lang="en-US" sz="2000" dirty="0">
+                <a:solidFill>
+                  <a:schemeClr val="tx1"/>
+                </a:solidFill>
+                <a:latin typeface="Courier New" panose="02070309020205020404" pitchFamily="49" charset="0"/>
+                <a:cs typeface="Courier New" panose="02070309020205020404" pitchFamily="49" charset="0"/>
+              </a:rPr>
+              <a:t>  delay(time)</a:t>
+            </a:r>
+            <a:endParaRPr lang="en-US" sz="2000" i="1" dirty="0">
+              <a:solidFill>
+                <a:schemeClr val="accent6"/>
+              </a:solidFill>
+              <a:latin typeface="Courier New" panose="02070309020205020404" pitchFamily="49" charset="0"/>
+              <a:cs typeface="Courier New" panose="02070309020205020404" pitchFamily="49" charset="0"/>
+            </a:endParaRPr>
+          </a:p>
+          <a:p>
+            <a:pPr marL="0" indent="0">
+              <a:buNone/>
+            </a:pPr>
+            <a:r>
+              <a:rPr lang="en-US" sz="2000" dirty="0">
+                <a:solidFill>
+                  <a:schemeClr val="tx1"/>
+                </a:solidFill>
+                <a:latin typeface="Courier New" panose="02070309020205020404" pitchFamily="49" charset="0"/>
+                <a:cs typeface="Courier New" panose="02070309020205020404" pitchFamily="49" charset="0"/>
+              </a:rPr>
+              <a:t>  </a:t>
+            </a:r>
+            <a:r>
+              <a:rPr lang="en-US" sz="2000" dirty="0" err="1">
+                <a:solidFill>
+                  <a:schemeClr val="tx1"/>
+                </a:solidFill>
+                <a:latin typeface="Courier New" panose="02070309020205020404" pitchFamily="49" charset="0"/>
+                <a:cs typeface="Courier New" panose="02070309020205020404" pitchFamily="49" charset="0"/>
+              </a:rPr>
+              <a:t>println</a:t>
+            </a:r>
+            <a:r>
+              <a:rPr lang="en-US" sz="2000" dirty="0">
+                <a:solidFill>
+                  <a:schemeClr val="tx1"/>
+                </a:solidFill>
+                <a:latin typeface="Courier New" panose="02070309020205020404" pitchFamily="49" charset="0"/>
+                <a:cs typeface="Courier New" panose="02070309020205020404" pitchFamily="49" charset="0"/>
+              </a:rPr>
+              <a:t>(message)</a:t>
+            </a:r>
+          </a:p>
+          <a:p>
+            <a:pPr marL="0" indent="0">
+              <a:buNone/>
+            </a:pPr>
+            <a:r>
+              <a:rPr lang="en-US" sz="2000" dirty="0">
+                <a:solidFill>
+                  <a:schemeClr val="tx1"/>
+                </a:solidFill>
+                <a:latin typeface="Courier New" panose="02070309020205020404" pitchFamily="49" charset="0"/>
+                <a:cs typeface="Courier New" panose="02070309020205020404" pitchFamily="49" charset="0"/>
+              </a:rPr>
+              <a:t>}</a:t>
+            </a:r>
+          </a:p>
+          <a:p>
+            <a:pPr marL="0" indent="0">
+              <a:buNone/>
+            </a:pPr>
+            <a:r>
+              <a:rPr lang="en-US" sz="2000" dirty="0" err="1">
+                <a:solidFill>
+                  <a:schemeClr val="tx1"/>
+                </a:solidFill>
+                <a:latin typeface="Courier New" panose="02070309020205020404" pitchFamily="49" charset="0"/>
+                <a:cs typeface="Courier New" panose="02070309020205020404" pitchFamily="49" charset="0"/>
+              </a:rPr>
+              <a:t>GlobalScope.launch</a:t>
+            </a:r>
+            <a:r>
+              <a:rPr lang="en-US" sz="2000" dirty="0">
+                <a:solidFill>
+                  <a:schemeClr val="tx1"/>
+                </a:solidFill>
+                <a:latin typeface="Courier New" panose="02070309020205020404" pitchFamily="49" charset="0"/>
+                <a:cs typeface="Courier New" panose="02070309020205020404" pitchFamily="49" charset="0"/>
+              </a:rPr>
+              <a:t>(</a:t>
+            </a:r>
+            <a:r>
+              <a:rPr lang="en-US" sz="2000" dirty="0" err="1">
+                <a:solidFill>
+                  <a:schemeClr val="tx1"/>
+                </a:solidFill>
+                <a:latin typeface="Courier New" panose="02070309020205020404" pitchFamily="49" charset="0"/>
+                <a:cs typeface="Courier New" panose="02070309020205020404" pitchFamily="49" charset="0"/>
+              </a:rPr>
+              <a:t>Dispatchers.Main</a:t>
+            </a:r>
+            <a:r>
+              <a:rPr lang="en-US" sz="2000" dirty="0">
+                <a:solidFill>
+                  <a:schemeClr val="tx1"/>
+                </a:solidFill>
+                <a:latin typeface="Courier New" panose="02070309020205020404" pitchFamily="49" charset="0"/>
+                <a:cs typeface="Courier New" panose="02070309020205020404" pitchFamily="49" charset="0"/>
+              </a:rPr>
+              <a:t>){</a:t>
+            </a:r>
+          </a:p>
+          <a:p>
+            <a:pPr marL="0" indent="0">
+              <a:buNone/>
+            </a:pPr>
+            <a:r>
+              <a:rPr lang="en-US" sz="2000" dirty="0">
+                <a:solidFill>
+                  <a:schemeClr val="tx1"/>
+                </a:solidFill>
+                <a:latin typeface="Courier New" panose="02070309020205020404" pitchFamily="49" charset="0"/>
+                <a:cs typeface="Courier New" panose="02070309020205020404" pitchFamily="49" charset="0"/>
+              </a:rPr>
+              <a:t>  </a:t>
+            </a:r>
+            <a:r>
+              <a:rPr lang="en-US" sz="2000" dirty="0" err="1">
+                <a:solidFill>
+                  <a:schemeClr val="tx1"/>
+                </a:solidFill>
+                <a:latin typeface="Courier New" panose="02070309020205020404" pitchFamily="49" charset="0"/>
+                <a:cs typeface="Courier New" panose="02070309020205020404" pitchFamily="49" charset="0"/>
+              </a:rPr>
+              <a:t>waitAndPrint</a:t>
+            </a:r>
+            <a:r>
+              <a:rPr lang="en-US" sz="2000" dirty="0">
+                <a:solidFill>
+                  <a:schemeClr val="tx1"/>
+                </a:solidFill>
+                <a:latin typeface="Courier New" panose="02070309020205020404" pitchFamily="49" charset="0"/>
+                <a:cs typeface="Courier New" panose="02070309020205020404" pitchFamily="49" charset="0"/>
+              </a:rPr>
+              <a:t>(1000L, "2")</a:t>
+            </a:r>
+          </a:p>
+          <a:p>
+            <a:pPr marL="0" indent="0">
+              <a:buNone/>
+            </a:pPr>
+            <a:r>
+              <a:rPr lang="en-US" sz="2000" dirty="0">
+                <a:solidFill>
+                  <a:schemeClr val="tx1"/>
+                </a:solidFill>
+                <a:latin typeface="Courier New" panose="02070309020205020404" pitchFamily="49" charset="0"/>
+                <a:cs typeface="Courier New" panose="02070309020205020404" pitchFamily="49" charset="0"/>
+              </a:rPr>
+              <a:t>}</a:t>
+            </a:r>
+          </a:p>
+          <a:p>
+            <a:pPr marL="0" indent="0">
+              <a:buNone/>
+            </a:pPr>
+            <a:r>
+              <a:rPr lang="en-US" sz="2000" dirty="0" err="1">
+                <a:solidFill>
+                  <a:schemeClr val="tx1"/>
+                </a:solidFill>
+                <a:latin typeface="Courier New" panose="02070309020205020404" pitchFamily="49" charset="0"/>
+                <a:cs typeface="Courier New" panose="02070309020205020404" pitchFamily="49" charset="0"/>
+              </a:rPr>
+              <a:t>GlobalScope.launch</a:t>
+            </a:r>
+            <a:r>
+              <a:rPr lang="en-US" sz="2000" dirty="0">
+                <a:solidFill>
+                  <a:schemeClr val="tx1"/>
+                </a:solidFill>
+                <a:latin typeface="Courier New" panose="02070309020205020404" pitchFamily="49" charset="0"/>
+                <a:cs typeface="Courier New" panose="02070309020205020404" pitchFamily="49" charset="0"/>
+              </a:rPr>
+              <a:t>(</a:t>
+            </a:r>
+            <a:r>
+              <a:rPr lang="en-US" sz="2000" dirty="0" err="1">
+                <a:solidFill>
+                  <a:schemeClr val="tx1"/>
+                </a:solidFill>
+                <a:latin typeface="Courier New" panose="02070309020205020404" pitchFamily="49" charset="0"/>
+                <a:cs typeface="Courier New" panose="02070309020205020404" pitchFamily="49" charset="0"/>
+              </a:rPr>
+              <a:t>Dispatchers.Main</a:t>
+            </a:r>
+            <a:r>
+              <a:rPr lang="en-US" sz="2000" dirty="0">
+                <a:solidFill>
+                  <a:schemeClr val="tx1"/>
+                </a:solidFill>
+                <a:latin typeface="Courier New" panose="02070309020205020404" pitchFamily="49" charset="0"/>
+                <a:cs typeface="Courier New" panose="02070309020205020404" pitchFamily="49" charset="0"/>
+              </a:rPr>
+              <a:t>){</a:t>
+            </a:r>
+          </a:p>
+          <a:p>
+            <a:pPr marL="0" indent="0">
+              <a:buNone/>
+            </a:pPr>
+            <a:r>
+              <a:rPr lang="en-US" sz="2000" dirty="0">
+                <a:solidFill>
+                  <a:schemeClr val="tx1"/>
+                </a:solidFill>
+                <a:latin typeface="Courier New" panose="02070309020205020404" pitchFamily="49" charset="0"/>
+                <a:cs typeface="Courier New" panose="02070309020205020404" pitchFamily="49" charset="0"/>
+              </a:rPr>
+              <a:t>  </a:t>
+            </a:r>
+            <a:r>
+              <a:rPr lang="en-US" sz="2000" dirty="0" err="1">
+                <a:solidFill>
+                  <a:schemeClr val="tx1"/>
+                </a:solidFill>
+                <a:latin typeface="Courier New" panose="02070309020205020404" pitchFamily="49" charset="0"/>
+                <a:cs typeface="Courier New" panose="02070309020205020404" pitchFamily="49" charset="0"/>
+              </a:rPr>
+              <a:t>println</a:t>
+            </a:r>
+            <a:r>
+              <a:rPr lang="en-US" sz="2000" dirty="0">
+                <a:solidFill>
+                  <a:schemeClr val="tx1"/>
+                </a:solidFill>
+                <a:latin typeface="Courier New" panose="02070309020205020404" pitchFamily="49" charset="0"/>
+                <a:cs typeface="Courier New" panose="02070309020205020404" pitchFamily="49" charset="0"/>
+              </a:rPr>
+              <a:t>("1")</a:t>
+            </a:r>
+          </a:p>
+          <a:p>
+            <a:pPr marL="0" indent="0">
+              <a:buNone/>
+            </a:pPr>
+            <a:r>
+              <a:rPr lang="en-US" sz="2000" dirty="0">
+                <a:solidFill>
+                  <a:schemeClr val="tx1"/>
+                </a:solidFill>
+                <a:latin typeface="Courier New" panose="02070309020205020404" pitchFamily="49" charset="0"/>
+                <a:cs typeface="Courier New" panose="02070309020205020404" pitchFamily="49" charset="0"/>
+              </a:rPr>
+              <a:t>}</a:t>
+            </a:r>
+          </a:p>
+        </p:txBody>
+      </p:sp>
+    </p:spTree>
+    <p:extLst>
+      <p:ext uri="{BB962C8B-B14F-4D97-AF65-F5344CB8AC3E}">
+        <p14:creationId xmlns:p14="http://schemas.microsoft.com/office/powerpoint/2010/main" val="1297195261"/>
+      </p:ext>
+    </p:extLst>
+  </p:cSld>
+  <p:clrMapOvr>
+    <a:masterClrMapping/>
+  </p:clrMapOvr>
+  <p:timing>
+    <p:tnLst>
+      <p:par>
+        <p:cTn id="1" dur="indefinite" restart="never" nodeType="tmRoot">
+          <p:childTnLst>
+            <p:seq concurrent="1" nextAc="seek">
+              <p:cTn id="2" dur="indefinite" nodeType="mainSeq">
+                <p:childTnLst>
+                  <p:par>
+                    <p:cTn id="3" fill="hold">
+                      <p:stCondLst>
+                        <p:cond delay="indefinite"/>
+                      </p:stCondLst>
+                      <p:childTnLst>
+                        <p:par>
+                          <p:cTn id="4" fill="hold">
+                            <p:stCondLst>
+                              <p:cond delay="0"/>
+                            </p:stCondLst>
+                            <p:childTnLst>
+                              <p:par>
+                                <p:cTn id="5" presetID="1" presetClass="entr" presetSubtype="0" fill="hold" grpId="0" nodeType="clickEffect">
+                                  <p:stCondLst>
+                                    <p:cond delay="0"/>
+                                  </p:stCondLst>
+                                  <p:childTnLst>
+                                    <p:set>
+                                      <p:cBhvr>
+                                        <p:cTn id="6" dur="1" fill="hold">
+                                          <p:stCondLst>
+                                            <p:cond delay="0"/>
+                                          </p:stCondLst>
+                                        </p:cTn>
+                                        <p:tgtEl>
+                                          <p:spTgt spid="5">
+                                            <p:txEl>
+                                              <p:pRg st="0" end="0"/>
+                                            </p:txEl>
+                                          </p:spTgt>
+                                        </p:tgtEl>
+                                        <p:attrNameLst>
+                                          <p:attrName>style.visibility</p:attrName>
+                                        </p:attrNameLst>
+                                      </p:cBhvr>
+                                      <p:to>
+                                        <p:strVal val="visible"/>
+                                      </p:to>
+                                    </p:set>
+                                  </p:childTnLst>
+                                </p:cTn>
+                              </p:par>
+                            </p:childTnLst>
+                          </p:cTn>
+                        </p:par>
+                      </p:childTnLst>
+                    </p:cTn>
+                  </p:par>
+                  <p:par>
+                    <p:cTn id="7" fill="hold">
+                      <p:stCondLst>
+                        <p:cond delay="indefinite"/>
+                      </p:stCondLst>
+                      <p:childTnLst>
+                        <p:par>
+                          <p:cTn id="8" fill="hold">
+                            <p:stCondLst>
+                              <p:cond delay="0"/>
+                            </p:stCondLst>
+                            <p:childTnLst>
+                              <p:par>
+                                <p:cTn id="9" presetID="1" presetClass="entr" presetSubtype="0" fill="hold" grpId="0" nodeType="clickEffect">
+                                  <p:stCondLst>
+                                    <p:cond delay="0"/>
+                                  </p:stCondLst>
+                                  <p:childTnLst>
+                                    <p:set>
+                                      <p:cBhvr>
+                                        <p:cTn id="10" dur="1" fill="hold">
+                                          <p:stCondLst>
+                                            <p:cond delay="0"/>
+                                          </p:stCondLst>
+                                        </p:cTn>
+                                        <p:tgtEl>
+                                          <p:spTgt spid="6">
+                                            <p:bg/>
+                                          </p:spTgt>
+                                        </p:tgtEl>
+                                        <p:attrNameLst>
+                                          <p:attrName>style.visibility</p:attrName>
+                                        </p:attrNameLst>
+                                      </p:cBhvr>
+                                      <p:to>
+                                        <p:strVal val="visible"/>
+                                      </p:to>
+                                    </p:set>
+                                  </p:childTnLst>
+                                </p:cTn>
+                              </p:par>
+                            </p:childTnLst>
+                          </p:cTn>
+                        </p:par>
+                      </p:childTnLst>
+                    </p:cTn>
+                  </p:par>
+                  <p:par>
+                    <p:cTn id="11" fill="hold">
+                      <p:stCondLst>
+                        <p:cond delay="indefinite"/>
+                      </p:stCondLst>
+                      <p:childTnLst>
+                        <p:par>
+                          <p:cTn id="12" fill="hold">
+                            <p:stCondLst>
+                              <p:cond delay="0"/>
+                            </p:stCondLst>
+                            <p:childTnLst>
+                              <p:par>
+                                <p:cTn id="13" presetID="1" presetClass="entr" presetSubtype="0" fill="hold" nodeType="clickEffect">
+                                  <p:stCondLst>
+                                    <p:cond delay="0"/>
+                                  </p:stCondLst>
+                                  <p:childTnLst>
+                                    <p:set>
+                                      <p:cBhvr>
+                                        <p:cTn id="14" dur="1" fill="hold">
+                                          <p:stCondLst>
+                                            <p:cond delay="0"/>
+                                          </p:stCondLst>
+                                        </p:cTn>
+                                        <p:tgtEl>
+                                          <p:spTgt spid="6">
+                                            <p:txEl>
+                                              <p:pRg st="0" end="0"/>
+                                            </p:txEl>
+                                          </p:spTgt>
+                                        </p:tgtEl>
+                                        <p:attrNameLst>
+                                          <p:attrName>style.visibility</p:attrName>
+                                        </p:attrNameLst>
+                                      </p:cBhvr>
+                                      <p:to>
+                                        <p:strVal val="visible"/>
+                                      </p:to>
+                                    </p:set>
+                                  </p:childTnLst>
+                                </p:cTn>
+                              </p:par>
+                              <p:par>
+                                <p:cTn id="15" presetID="1" presetClass="entr" presetSubtype="0" fill="hold" nodeType="withEffect">
+                                  <p:stCondLst>
+                                    <p:cond delay="0"/>
+                                  </p:stCondLst>
+                                  <p:childTnLst>
+                                    <p:set>
+                                      <p:cBhvr>
+                                        <p:cTn id="16" dur="1" fill="hold">
+                                          <p:stCondLst>
+                                            <p:cond delay="0"/>
+                                          </p:stCondLst>
+                                        </p:cTn>
+                                        <p:tgtEl>
+                                          <p:spTgt spid="6">
+                                            <p:txEl>
+                                              <p:pRg st="3" end="3"/>
+                                            </p:txEl>
+                                          </p:spTgt>
+                                        </p:tgtEl>
+                                        <p:attrNameLst>
+                                          <p:attrName>style.visibility</p:attrName>
+                                        </p:attrNameLst>
+                                      </p:cBhvr>
+                                      <p:to>
+                                        <p:strVal val="visible"/>
+                                      </p:to>
+                                    </p:set>
+                                  </p:childTnLst>
+                                </p:cTn>
+                              </p:par>
+                            </p:childTnLst>
+                          </p:cTn>
+                        </p:par>
+                      </p:childTnLst>
+                    </p:cTn>
+                  </p:par>
+                  <p:par>
+                    <p:cTn id="17" fill="hold">
+                      <p:stCondLst>
+                        <p:cond delay="indefinite"/>
+                      </p:stCondLst>
+                      <p:childTnLst>
+                        <p:par>
+                          <p:cTn id="18" fill="hold">
+                            <p:stCondLst>
+                              <p:cond delay="0"/>
+                            </p:stCondLst>
+                            <p:childTnLst>
+                              <p:par>
+                                <p:cTn id="19" presetID="1" presetClass="entr" presetSubtype="0" fill="hold" nodeType="clickEffect">
+                                  <p:stCondLst>
+                                    <p:cond delay="0"/>
+                                  </p:stCondLst>
+                                  <p:childTnLst>
+                                    <p:set>
+                                      <p:cBhvr>
+                                        <p:cTn id="20" dur="1" fill="hold">
+                                          <p:stCondLst>
+                                            <p:cond delay="0"/>
+                                          </p:stCondLst>
+                                        </p:cTn>
+                                        <p:tgtEl>
+                                          <p:spTgt spid="6">
+                                            <p:txEl>
+                                              <p:pRg st="1" end="1"/>
+                                            </p:txEl>
+                                          </p:spTgt>
+                                        </p:tgtEl>
+                                        <p:attrNameLst>
+                                          <p:attrName>style.visibility</p:attrName>
+                                        </p:attrNameLst>
+                                      </p:cBhvr>
+                                      <p:to>
+                                        <p:strVal val="visible"/>
+                                      </p:to>
+                                    </p:set>
+                                  </p:childTnLst>
+                                </p:cTn>
+                              </p:par>
+                            </p:childTnLst>
+                          </p:cTn>
+                        </p:par>
+                      </p:childTnLst>
+                    </p:cTn>
+                  </p:par>
+                  <p:par>
+                    <p:cTn id="21" fill="hold">
+                      <p:stCondLst>
+                        <p:cond delay="indefinite"/>
+                      </p:stCondLst>
+                      <p:childTnLst>
+                        <p:par>
+                          <p:cTn id="22" fill="hold">
+                            <p:stCondLst>
+                              <p:cond delay="0"/>
+                            </p:stCondLst>
+                            <p:childTnLst>
+                              <p:par>
+                                <p:cTn id="23" presetID="1" presetClass="entr" presetSubtype="0" fill="hold" nodeType="clickEffect">
+                                  <p:stCondLst>
+                                    <p:cond delay="0"/>
+                                  </p:stCondLst>
+                                  <p:childTnLst>
+                                    <p:set>
+                                      <p:cBhvr>
+                                        <p:cTn id="24" dur="1" fill="hold">
+                                          <p:stCondLst>
+                                            <p:cond delay="0"/>
+                                          </p:stCondLst>
+                                        </p:cTn>
+                                        <p:tgtEl>
+                                          <p:spTgt spid="6">
+                                            <p:txEl>
+                                              <p:pRg st="2" end="2"/>
+                                            </p:txEl>
+                                          </p:spTgt>
+                                        </p:tgtEl>
+                                        <p:attrNameLst>
+                                          <p:attrName>style.visibility</p:attrName>
+                                        </p:attrNameLst>
+                                      </p:cBhvr>
+                                      <p:to>
+                                        <p:strVal val="visible"/>
+                                      </p:to>
+                                    </p:set>
+                                  </p:childTnLst>
+                                </p:cTn>
+                              </p:par>
+                            </p:childTnLst>
+                          </p:cTn>
+                        </p:par>
+                      </p:childTnLst>
+                    </p:cTn>
+                  </p:par>
+                  <p:par>
+                    <p:cTn id="25" fill="hold">
+                      <p:stCondLst>
+                        <p:cond delay="indefinite"/>
+                      </p:stCondLst>
+                      <p:childTnLst>
+                        <p:par>
+                          <p:cTn id="26" fill="hold">
+                            <p:stCondLst>
+                              <p:cond delay="0"/>
+                            </p:stCondLst>
+                            <p:childTnLst>
+                              <p:par>
+                                <p:cTn id="27" presetID="1" presetClass="entr" presetSubtype="0" fill="hold" nodeType="clickEffect">
+                                  <p:stCondLst>
+                                    <p:cond delay="0"/>
+                                  </p:stCondLst>
+                                  <p:childTnLst>
+                                    <p:set>
+                                      <p:cBhvr>
+                                        <p:cTn id="28" dur="1" fill="hold">
+                                          <p:stCondLst>
+                                            <p:cond delay="0"/>
+                                          </p:stCondLst>
+                                        </p:cTn>
+                                        <p:tgtEl>
+                                          <p:spTgt spid="6">
+                                            <p:txEl>
+                                              <p:pRg st="4" end="4"/>
+                                            </p:txEl>
+                                          </p:spTgt>
+                                        </p:tgtEl>
+                                        <p:attrNameLst>
+                                          <p:attrName>style.visibility</p:attrName>
+                                        </p:attrNameLst>
+                                      </p:cBhvr>
+                                      <p:to>
+                                        <p:strVal val="visible"/>
+                                      </p:to>
+                                    </p:set>
+                                  </p:childTnLst>
+                                </p:cTn>
+                              </p:par>
+                              <p:par>
+                                <p:cTn id="29" presetID="1" presetClass="entr" presetSubtype="0" fill="hold" nodeType="withEffect">
+                                  <p:stCondLst>
+                                    <p:cond delay="0"/>
+                                  </p:stCondLst>
+                                  <p:childTnLst>
+                                    <p:set>
+                                      <p:cBhvr>
+                                        <p:cTn id="30" dur="1" fill="hold">
+                                          <p:stCondLst>
+                                            <p:cond delay="0"/>
+                                          </p:stCondLst>
+                                        </p:cTn>
+                                        <p:tgtEl>
+                                          <p:spTgt spid="6">
+                                            <p:txEl>
+                                              <p:pRg st="6" end="6"/>
+                                            </p:txEl>
+                                          </p:spTgt>
+                                        </p:tgtEl>
+                                        <p:attrNameLst>
+                                          <p:attrName>style.visibility</p:attrName>
+                                        </p:attrNameLst>
+                                      </p:cBhvr>
+                                      <p:to>
+                                        <p:strVal val="visible"/>
+                                      </p:to>
+                                    </p:set>
+                                  </p:childTnLst>
+                                </p:cTn>
+                              </p:par>
+                            </p:childTnLst>
+                          </p:cTn>
+                        </p:par>
+                      </p:childTnLst>
+                    </p:cTn>
+                  </p:par>
+                  <p:par>
+                    <p:cTn id="31" fill="hold">
+                      <p:stCondLst>
+                        <p:cond delay="indefinite"/>
+                      </p:stCondLst>
+                      <p:childTnLst>
+                        <p:par>
+                          <p:cTn id="32" fill="hold">
+                            <p:stCondLst>
+                              <p:cond delay="0"/>
+                            </p:stCondLst>
+                            <p:childTnLst>
+                              <p:par>
+                                <p:cTn id="33" presetID="1" presetClass="entr" presetSubtype="0" fill="hold" nodeType="clickEffect">
+                                  <p:stCondLst>
+                                    <p:cond delay="0"/>
+                                  </p:stCondLst>
+                                  <p:childTnLst>
+                                    <p:set>
+                                      <p:cBhvr>
+                                        <p:cTn id="34" dur="1" fill="hold">
+                                          <p:stCondLst>
+                                            <p:cond delay="0"/>
+                                          </p:stCondLst>
+                                        </p:cTn>
+                                        <p:tgtEl>
+                                          <p:spTgt spid="6">
+                                            <p:txEl>
+                                              <p:pRg st="7" end="7"/>
+                                            </p:txEl>
+                                          </p:spTgt>
+                                        </p:tgtEl>
+                                        <p:attrNameLst>
+                                          <p:attrName>style.visibility</p:attrName>
+                                        </p:attrNameLst>
+                                      </p:cBhvr>
+                                      <p:to>
+                                        <p:strVal val="visible"/>
+                                      </p:to>
+                                    </p:set>
+                                  </p:childTnLst>
+                                </p:cTn>
+                              </p:par>
+                              <p:par>
+                                <p:cTn id="35" presetID="1" presetClass="entr" presetSubtype="0" fill="hold" nodeType="withEffect">
                                   <p:stCondLst>
                                     <p:cond delay="0"/>
                                   </p:stCondLst>
@@ -12048,7 +12196,7 @@
                                         <p:tgtEl>
                                           <p:spTgt spid="6">
                                             <p:txEl>
-                                              <p:pRg st="1" end="1"/>
+                                              <p:pRg st="9" end="9"/>
                                             </p:txEl>
                                           </p:spTgt>
                                         </p:tgtEl>
@@ -12097,7 +12245,7 @@
                                         <p:tgtEl>
                                           <p:spTgt spid="6">
                                             <p:txEl>
-                                              <p:pRg st="8" end="8"/>
+                                              <p:pRg st="5" end="5"/>
                                             </p:txEl>
                                           </p:spTgt>
                                         </p:tgtEl>
@@ -12146,7 +12294,7 @@
                                         <p:tgtEl>
                                           <p:spTgt spid="6">
                                             <p:txEl>
-                                              <p:pRg st="2" end="2"/>
+                                              <p:pRg st="8" end="8"/>
                                             </p:txEl>
                                           </p:spTgt>
                                         </p:tgtEl>
@@ -12268,7 +12416,7 @@
           <a:p>
             <a:r>
               <a:rPr lang="en-US" dirty="0"/>
-              <a:t>Spring 2020</a:t>
+              <a:t>Spring 2021</a:t>
             </a:r>
           </a:p>
         </p:txBody>
@@ -12763,7 +12911,7 @@
           <a:p>
             <a:r>
               <a:rPr lang="en-US" dirty="0"/>
-              <a:t>A background thread</a:t>
+              <a:t>A background THREAD</a:t>
             </a:r>
           </a:p>
         </p:txBody>
@@ -13333,7 +13481,7 @@
             </a:pPr>
             <a:r>
               <a:rPr lang="en-US" dirty="0"/>
-              <a:t>Usually you want to use coroutines instead.</a:t>
+              <a:t>Usually, you want to use coroutines instead.</a:t>
             </a:r>
           </a:p>
         </p:txBody>
@@ -14372,7 +14520,7 @@
         <p:spPr>
           <a:xfrm>
             <a:off x="9247597" y="4184211"/>
-            <a:ext cx="2321959" cy="923330"/>
+            <a:ext cx="2588328" cy="923330"/>
           </a:xfrm>
         </p:spPr>
         <p:txBody>
@@ -14386,7 +14534,7 @@
             </a:pPr>
             <a:r>
               <a:rPr lang="en-US" sz="2000" dirty="0"/>
-              <a:t>Contains the code that should be executed.</a:t>
+              <a:t>Contains the code that should be executed by a thread.</a:t>
             </a:r>
           </a:p>
         </p:txBody>
@@ -14839,7 +14987,7 @@
             </a:pPr>
             <a:r>
               <a:rPr lang="en-US" sz="2000" dirty="0"/>
-              <a:t>Controls the execution of a Coroutine Scope.</a:t>
+              <a:t>Controls the execution of a Coroutine.</a:t>
             </a:r>
           </a:p>
         </p:txBody>
@@ -17013,7 +17161,7 @@
           <a:p>
             <a:r>
               <a:rPr lang="en-US" dirty="0"/>
-              <a:t>Frameworks usually provide their own Coroutine Scopes, e.g.:</a:t>
+              <a:t>Frameworks can provide their own Coroutine Scopes, e.g.:</a:t>
             </a:r>
           </a:p>
           <a:p>

</xml_diff>